<commit_message>
Final Changes and Commits
</commit_message>
<xml_diff>
--- a/EDA Non-Technical Presentation.pptx
+++ b/EDA Non-Technical Presentation.pptx
@@ -5,7 +5,7 @@
     <p:sldMasterId id="2147483648" r:id="rId1"/>
   </p:sldMasterIdLst>
   <p:notesMasterIdLst>
-    <p:notesMasterId r:id="rId17"/>
+    <p:notesMasterId r:id="rId24"/>
   </p:notesMasterIdLst>
   <p:sldIdLst>
     <p:sldId id="256" r:id="rId2"/>
@@ -15,14 +15,21 @@
     <p:sldId id="259" r:id="rId6"/>
     <p:sldId id="258" r:id="rId7"/>
     <p:sldId id="261" r:id="rId8"/>
-    <p:sldId id="262" r:id="rId9"/>
-    <p:sldId id="264" r:id="rId10"/>
-    <p:sldId id="263" r:id="rId11"/>
-    <p:sldId id="265" r:id="rId12"/>
+    <p:sldId id="264" r:id="rId9"/>
+    <p:sldId id="262" r:id="rId10"/>
+    <p:sldId id="265" r:id="rId11"/>
+    <p:sldId id="266" r:id="rId12"/>
     <p:sldId id="267" r:id="rId13"/>
-    <p:sldId id="266" r:id="rId14"/>
-    <p:sldId id="268" r:id="rId15"/>
-    <p:sldId id="260" r:id="rId16"/>
+    <p:sldId id="276" r:id="rId14"/>
+    <p:sldId id="278" r:id="rId15"/>
+    <p:sldId id="277" r:id="rId16"/>
+    <p:sldId id="273" r:id="rId17"/>
+    <p:sldId id="272" r:id="rId18"/>
+    <p:sldId id="280" r:id="rId19"/>
+    <p:sldId id="274" r:id="rId20"/>
+    <p:sldId id="279" r:id="rId21"/>
+    <p:sldId id="275" r:id="rId22"/>
+    <p:sldId id="281" r:id="rId23"/>
   </p:sldIdLst>
   <p:sldSz cx="9144000" cy="5143500" type="screen16x9"/>
   <p:notesSz cx="6858000" cy="9144000"/>
@@ -222,7 +229,7 @@
           <a:p>
             <a:fld id="{C8D18E60-4300-4729-A0D7-6AB984C3922D}" type="datetimeFigureOut">
               <a:rPr lang="en-US" smtClean="0"/>
-              <a:t>5/22/2022</a:t>
+              <a:t>5/23/2022</a:t>
             </a:fld>
             <a:endParaRPr lang="en-US"/>
           </a:p>
@@ -516,7 +523,12 @@
             <p:ph type="sldImg"/>
           </p:nvPr>
         </p:nvSpPr>
-        <p:spPr/>
+        <p:spPr>
+          <a:xfrm>
+            <a:off x="685800" y="1143000"/>
+            <a:ext cx="5486400" cy="3086100"/>
+          </a:xfrm>
+        </p:spPr>
       </p:sp>
       <p:sp>
         <p:nvSpPr>
@@ -554,7 +566,96 @@
           <a:p>
             <a:fld id="{87350B06-B074-48FC-8CFD-53D2CD8FB95F}" type="slidenum">
               <a:rPr lang="en-US" smtClean="0"/>
-              <a:t>15</a:t>
+              <a:t>16</a:t>
+            </a:fld>
+            <a:endParaRPr lang="en-US"/>
+          </a:p>
+        </p:txBody>
+      </p:sp>
+    </p:spTree>
+    <p:extLst>
+      <p:ext uri="{BB962C8B-B14F-4D97-AF65-F5344CB8AC3E}">
+        <p14:creationId xmlns:p14="http://schemas.microsoft.com/office/powerpoint/2010/main" val="1284596819"/>
+      </p:ext>
+    </p:extLst>
+  </p:cSld>
+  <p:clrMapOvr>
+    <a:masterClrMapping/>
+  </p:clrMapOvr>
+</p:notes>
+</file>
+
+<file path=ppt/notesSlides/notesSlide2.xml><?xml version="1.0" encoding="utf-8"?>
+<p:notes xmlns:a="http://schemas.openxmlformats.org/drawingml/2006/main" xmlns:r="http://schemas.openxmlformats.org/officeDocument/2006/relationships" xmlns:p="http://schemas.openxmlformats.org/presentationml/2006/main">
+  <p:cSld>
+    <p:spTree>
+      <p:nvGrpSpPr>
+        <p:cNvPr id="1" name=""/>
+        <p:cNvGrpSpPr/>
+        <p:nvPr/>
+      </p:nvGrpSpPr>
+      <p:grpSpPr>
+        <a:xfrm>
+          <a:off x="0" y="0"/>
+          <a:ext cx="0" cy="0"/>
+          <a:chOff x="0" y="0"/>
+          <a:chExt cx="0" cy="0"/>
+        </a:xfrm>
+      </p:grpSpPr>
+      <p:sp>
+        <p:nvSpPr>
+          <p:cNvPr id="2" name="Slide Image Placeholder 1"/>
+          <p:cNvSpPr>
+            <a:spLocks noGrp="1" noRot="1" noChangeAspect="1"/>
+          </p:cNvSpPr>
+          <p:nvPr>
+            <p:ph type="sldImg"/>
+          </p:nvPr>
+        </p:nvSpPr>
+        <p:spPr>
+          <a:xfrm>
+            <a:off x="685800" y="1143000"/>
+            <a:ext cx="5486400" cy="3086100"/>
+          </a:xfrm>
+        </p:spPr>
+      </p:sp>
+      <p:sp>
+        <p:nvSpPr>
+          <p:cNvPr id="3" name="Notes Placeholder 2"/>
+          <p:cNvSpPr>
+            <a:spLocks noGrp="1"/>
+          </p:cNvSpPr>
+          <p:nvPr>
+            <p:ph type="body" idx="1"/>
+          </p:nvPr>
+        </p:nvSpPr>
+        <p:spPr/>
+        <p:txBody>
+          <a:bodyPr/>
+          <a:lstStyle/>
+          <a:p>
+            <a:endParaRPr lang="en-US"/>
+          </a:p>
+        </p:txBody>
+      </p:sp>
+      <p:sp>
+        <p:nvSpPr>
+          <p:cNvPr id="4" name="Slide Number Placeholder 3"/>
+          <p:cNvSpPr>
+            <a:spLocks noGrp="1"/>
+          </p:cNvSpPr>
+          <p:nvPr>
+            <p:ph type="sldNum" sz="quarter" idx="10"/>
+          </p:nvPr>
+        </p:nvSpPr>
+        <p:spPr/>
+        <p:txBody>
+          <a:bodyPr/>
+          <a:lstStyle/>
+          <a:p>
+            <a:fld id="{87350B06-B074-48FC-8CFD-53D2CD8FB95F}" type="slidenum">
+              <a:rPr lang="en-US" smtClean="0"/>
+              <a:t>17</a:t>
             </a:fld>
             <a:endParaRPr lang="en-US"/>
           </a:p>
@@ -616,8 +717,8 @@
         </p:nvSpPr>
         <p:spPr>
           <a:xfrm>
-            <a:off x="449825" y="3392128"/>
-            <a:ext cx="7388941" cy="1246241"/>
+            <a:off x="449827" y="3392130"/>
+            <a:ext cx="7388940" cy="1246241"/>
           </a:xfrm>
           <a:noFill/>
           <a:effectLst>
@@ -792,7 +893,7 @@
             <a:fld id="{53074F12-AA26-4AC8-9962-C36BB8F32554}" type="datetimeFigureOut">
               <a:rPr lang="en-US" smtClean="0"/>
               <a:pPr/>
-              <a:t>5/22/2022</a:t>
+              <a:t>5/23/2022</a:t>
             </a:fld>
             <a:endParaRPr lang="en-US"/>
           </a:p>
@@ -883,7 +984,7 @@
         </p:nvSpPr>
         <p:spPr>
           <a:xfrm>
-            <a:off x="1792288" y="3600450"/>
+            <a:off x="1792288" y="3600451"/>
             <a:ext cx="5486400" cy="425054"/>
           </a:xfrm>
         </p:spPr>
@@ -975,7 +1076,7 @@
         </p:nvSpPr>
         <p:spPr>
           <a:xfrm>
-            <a:off x="1792288" y="4025503"/>
+            <a:off x="1792288" y="4025506"/>
             <a:ext cx="5486400" cy="603647"/>
           </a:xfrm>
         </p:spPr>
@@ -1046,7 +1147,7 @@
             <a:fld id="{53074F12-AA26-4AC8-9962-C36BB8F32554}" type="datetimeFigureOut">
               <a:rPr lang="en-US" smtClean="0"/>
               <a:pPr/>
-              <a:t>5/22/2022</a:t>
+              <a:t>5/23/2022</a:t>
             </a:fld>
             <a:endParaRPr lang="en-US"/>
           </a:p>
@@ -1216,7 +1317,7 @@
             <a:fld id="{53074F12-AA26-4AC8-9962-C36BB8F32554}" type="datetimeFigureOut">
               <a:rPr lang="en-US" smtClean="0"/>
               <a:pPr/>
-              <a:t>5/22/2022</a:t>
+              <a:t>5/23/2022</a:t>
             </a:fld>
             <a:endParaRPr lang="en-US"/>
           </a:p>
@@ -1307,8 +1408,8 @@
         </p:nvSpPr>
         <p:spPr>
           <a:xfrm>
-            <a:off x="6629400" y="205979"/>
-            <a:ext cx="2057400" cy="4388644"/>
+            <a:off x="6629403" y="205980"/>
+            <a:ext cx="2057401" cy="4388644"/>
           </a:xfrm>
         </p:spPr>
         <p:txBody>
@@ -1334,8 +1435,8 @@
         </p:nvSpPr>
         <p:spPr>
           <a:xfrm>
-            <a:off x="457200" y="205979"/>
-            <a:ext cx="6019800" cy="4388644"/>
+            <a:off x="457204" y="205980"/>
+            <a:ext cx="6019801" cy="4388644"/>
           </a:xfrm>
         </p:spPr>
         <p:txBody>
@@ -1396,7 +1497,7 @@
             <a:fld id="{53074F12-AA26-4AC8-9962-C36BB8F32554}" type="datetimeFigureOut">
               <a:rPr lang="en-US" smtClean="0"/>
               <a:pPr/>
-              <a:t>5/22/2022</a:t>
+              <a:t>5/23/2022</a:t>
             </a:fld>
             <a:endParaRPr lang="en-US"/>
           </a:p>
@@ -1473,8 +1574,8 @@
         </p:blipFill>
         <p:spPr bwMode="auto">
           <a:xfrm>
-            <a:off x="3808475" y="2326213"/>
-            <a:ext cx="1463784" cy="526961"/>
+            <a:off x="3808480" y="2326215"/>
+            <a:ext cx="1463785" cy="526961"/>
           </a:xfrm>
           <a:prstGeom prst="rect">
             <a:avLst/>
@@ -1536,8 +1637,8 @@
         </p:nvSpPr>
         <p:spPr>
           <a:xfrm>
-            <a:off x="471947" y="128473"/>
-            <a:ext cx="8259098" cy="763526"/>
+            <a:off x="471951" y="128473"/>
+            <a:ext cx="8259099" cy="763526"/>
           </a:xfrm>
         </p:spPr>
         <p:txBody>
@@ -1580,8 +1681,8 @@
         </p:nvSpPr>
         <p:spPr>
           <a:xfrm>
-            <a:off x="463714" y="1098756"/>
-            <a:ext cx="8246070" cy="3679720"/>
+            <a:off x="463718" y="1098756"/>
+            <a:ext cx="8246069" cy="3679720"/>
           </a:xfrm>
         </p:spPr>
         <p:txBody>
@@ -1678,7 +1779,7 @@
             <a:fld id="{53074F12-AA26-4AC8-9962-C36BB8F32554}" type="datetimeFigureOut">
               <a:rPr lang="en-US" smtClean="0"/>
               <a:pPr/>
-              <a:t>5/22/2022</a:t>
+              <a:t>5/23/2022</a:t>
             </a:fld>
             <a:endParaRPr lang="en-US"/>
           </a:p>
@@ -1783,8 +1884,8 @@
         </p:nvSpPr>
         <p:spPr>
           <a:xfrm>
-            <a:off x="486319" y="318046"/>
-            <a:ext cx="6291133" cy="725349"/>
+            <a:off x="486320" y="318047"/>
+            <a:ext cx="6291132" cy="725349"/>
           </a:xfrm>
         </p:spPr>
         <p:txBody>
@@ -1827,8 +1928,8 @@
         </p:nvSpPr>
         <p:spPr>
           <a:xfrm>
-            <a:off x="479322" y="1069258"/>
-            <a:ext cx="6312310" cy="3619239"/>
+            <a:off x="479327" y="1069259"/>
+            <a:ext cx="6312309" cy="3619239"/>
           </a:xfrm>
         </p:spPr>
         <p:txBody>
@@ -1925,7 +2026,7 @@
             <a:fld id="{53074F12-AA26-4AC8-9962-C36BB8F32554}" type="datetimeFigureOut">
               <a:rPr lang="en-US" smtClean="0"/>
               <a:pPr/>
-              <a:t>5/22/2022</a:t>
+              <a:t>5/23/2022</a:t>
             </a:fld>
             <a:endParaRPr lang="en-US"/>
           </a:p>
@@ -2016,7 +2117,7 @@
         </p:nvSpPr>
         <p:spPr>
           <a:xfrm>
-            <a:off x="722313" y="3305176"/>
+            <a:off x="722314" y="3305176"/>
             <a:ext cx="7772400" cy="1021556"/>
           </a:xfrm>
         </p:spPr>
@@ -2047,7 +2148,7 @@
         </p:nvSpPr>
         <p:spPr>
           <a:xfrm>
-            <a:off x="722313" y="2180035"/>
+            <a:off x="722314" y="2180035"/>
             <a:ext cx="7772400" cy="1125140"/>
           </a:xfrm>
         </p:spPr>
@@ -2172,7 +2273,7 @@
             <a:fld id="{53074F12-AA26-4AC8-9962-C36BB8F32554}" type="datetimeFigureOut">
               <a:rPr lang="en-US" smtClean="0"/>
               <a:pPr/>
-              <a:t>5/22/2022</a:t>
+              <a:t>5/23/2022</a:t>
             </a:fld>
             <a:endParaRPr lang="en-US"/>
           </a:p>
@@ -2285,8 +2386,8 @@
         </p:nvSpPr>
         <p:spPr>
           <a:xfrm>
-            <a:off x="457200" y="1200151"/>
-            <a:ext cx="4038600" cy="3394472"/>
+            <a:off x="457205" y="1200151"/>
+            <a:ext cx="4038601" cy="3394472"/>
           </a:xfrm>
         </p:spPr>
         <p:txBody>
@@ -2369,8 +2470,8 @@
         </p:nvSpPr>
         <p:spPr>
           <a:xfrm>
-            <a:off x="4648200" y="1200151"/>
-            <a:ext cx="4038600" cy="3394472"/>
+            <a:off x="4648201" y="1200151"/>
+            <a:ext cx="4038601" cy="3394472"/>
           </a:xfrm>
         </p:spPr>
         <p:txBody>
@@ -2459,7 +2560,7 @@
             <a:fld id="{53074F12-AA26-4AC8-9962-C36BB8F32554}" type="datetimeFigureOut">
               <a:rPr lang="en-US" smtClean="0"/>
               <a:pPr/>
-              <a:t>5/22/2022</a:t>
+              <a:t>5/23/2022</a:t>
             </a:fld>
             <a:endParaRPr lang="en-US"/>
           </a:p>
@@ -2550,7 +2651,7 @@
         </p:nvSpPr>
         <p:spPr>
           <a:xfrm>
-            <a:off x="525317" y="124163"/>
+            <a:off x="525322" y="124166"/>
             <a:ext cx="8093365" cy="763525"/>
           </a:xfrm>
         </p:spPr>
@@ -2594,7 +2695,7 @@
         </p:nvSpPr>
         <p:spPr>
           <a:xfrm>
-            <a:off x="522131" y="1441665"/>
+            <a:off x="522132" y="1441665"/>
             <a:ext cx="4040188" cy="479822"/>
           </a:xfrm>
         </p:spPr>
@@ -2663,7 +2764,7 @@
         </p:nvSpPr>
         <p:spPr>
           <a:xfrm>
-            <a:off x="522131" y="1914062"/>
+            <a:off x="522132" y="1914064"/>
             <a:ext cx="4040188" cy="2276294"/>
           </a:xfrm>
         </p:spPr>
@@ -2767,8 +2868,8 @@
         </p:nvSpPr>
         <p:spPr>
           <a:xfrm>
-            <a:off x="4557252" y="1441665"/>
-            <a:ext cx="4041775" cy="479822"/>
+            <a:off x="4557253" y="1441665"/>
+            <a:ext cx="4041774" cy="479822"/>
           </a:xfrm>
         </p:spPr>
         <p:txBody>
@@ -2836,8 +2937,8 @@
         </p:nvSpPr>
         <p:spPr>
           <a:xfrm>
-            <a:off x="4557252" y="1914062"/>
-            <a:ext cx="4041775" cy="2276294"/>
+            <a:off x="4557253" y="1914064"/>
+            <a:ext cx="4041774" cy="2276294"/>
           </a:xfrm>
         </p:spPr>
         <p:txBody>
@@ -2946,7 +3047,7 @@
             <a:fld id="{53074F12-AA26-4AC8-9962-C36BB8F32554}" type="datetimeFigureOut">
               <a:rPr lang="en-US" smtClean="0"/>
               <a:pPr/>
-              <a:t>5/22/2022</a:t>
+              <a:t>5/23/2022</a:t>
             </a:fld>
             <a:endParaRPr lang="en-US"/>
           </a:p>
@@ -3065,7 +3166,7 @@
             <a:fld id="{53074F12-AA26-4AC8-9962-C36BB8F32554}" type="datetimeFigureOut">
               <a:rPr lang="en-US" smtClean="0"/>
               <a:pPr/>
-              <a:t>5/22/2022</a:t>
+              <a:t>5/23/2022</a:t>
             </a:fld>
             <a:endParaRPr lang="en-US"/>
           </a:p>
@@ -3162,7 +3263,7 @@
             <a:fld id="{53074F12-AA26-4AC8-9962-C36BB8F32554}" type="datetimeFigureOut">
               <a:rPr lang="en-US" smtClean="0"/>
               <a:pPr/>
-              <a:t>5/22/2022</a:t>
+              <a:t>5/23/2022</a:t>
             </a:fld>
             <a:endParaRPr lang="en-US"/>
           </a:p>
@@ -3253,7 +3354,7 @@
         </p:nvSpPr>
         <p:spPr>
           <a:xfrm>
-            <a:off x="457201" y="204787"/>
+            <a:off x="457206" y="204787"/>
             <a:ext cx="3008313" cy="871538"/>
           </a:xfrm>
         </p:spPr>
@@ -3284,8 +3385,8 @@
         </p:nvSpPr>
         <p:spPr>
           <a:xfrm>
-            <a:off x="3575050" y="204788"/>
-            <a:ext cx="5111750" cy="4389835"/>
+            <a:off x="3575056" y="204791"/>
+            <a:ext cx="5111749" cy="4389835"/>
           </a:xfrm>
         </p:spPr>
         <p:txBody>
@@ -3368,7 +3469,7 @@
         </p:nvSpPr>
         <p:spPr>
           <a:xfrm>
-            <a:off x="457201" y="1076326"/>
+            <a:off x="457206" y="1076328"/>
             <a:ext cx="3008313" cy="3518297"/>
           </a:xfrm>
         </p:spPr>
@@ -3439,7 +3540,7 @@
             <a:fld id="{53074F12-AA26-4AC8-9962-C36BB8F32554}" type="datetimeFigureOut">
               <a:rPr lang="en-US" smtClean="0"/>
               <a:pPr/>
-              <a:t>5/22/2022</a:t>
+              <a:t>5/23/2022</a:t>
             </a:fld>
             <a:endParaRPr lang="en-US"/>
           </a:p>
@@ -3637,7 +3738,7 @@
         </p:nvSpPr>
         <p:spPr>
           <a:xfrm>
-            <a:off x="457200" y="4767263"/>
+            <a:off x="457200" y="4767264"/>
             <a:ext cx="2133600" cy="273844"/>
           </a:xfrm>
           <a:prstGeom prst="rect">
@@ -3661,7 +3762,7 @@
             <a:fld id="{53074F12-AA26-4AC8-9962-C36BB8F32554}" type="datetimeFigureOut">
               <a:rPr lang="en-US" smtClean="0"/>
               <a:pPr/>
-              <a:t>5/22/2022</a:t>
+              <a:t>5/23/2022</a:t>
             </a:fld>
             <a:endParaRPr lang="en-US"/>
           </a:p>
@@ -3679,7 +3780,7 @@
         </p:nvSpPr>
         <p:spPr>
           <a:xfrm>
-            <a:off x="3124200" y="4767263"/>
+            <a:off x="3124202" y="4767264"/>
             <a:ext cx="2895600" cy="273844"/>
           </a:xfrm>
           <a:prstGeom prst="rect">
@@ -3716,7 +3817,7 @@
         </p:nvSpPr>
         <p:spPr>
           <a:xfrm>
-            <a:off x="6553200" y="4767263"/>
+            <a:off x="6553200" y="4767264"/>
             <a:ext cx="2133600" cy="273844"/>
           </a:xfrm>
           <a:prstGeom prst="rect">
@@ -4103,7 +4204,7 @@
         </p:nvSpPr>
         <p:spPr>
           <a:xfrm>
-            <a:off x="156217" y="3331766"/>
+            <a:off x="156220" y="3331767"/>
             <a:ext cx="7027605" cy="1334728"/>
           </a:xfrm>
         </p:spPr>
@@ -4115,8 +4216,27 @@
           <a:p>
             <a:r>
               <a:rPr lang="en-US" sz="2400" dirty="0" smtClean="0"/>
-              <a:t>EXPLANATORY DATA ANALYSIS
+              <a:t>EXPLORATORY </a:t>
+            </a:r>
+            <a:r>
+              <a:rPr lang="en-US" sz="2400" dirty="0" smtClean="0"/>
+              <a:t>DATA ANALYSIS
 ON MOVIES DATASET. </a:t>
+            </a:r>
+            <a:r>
+              <a:rPr lang="en-US" sz="2400" dirty="0" smtClean="0"/>
+              <a:t/>
+            </a:r>
+            <a:br>
+              <a:rPr lang="en-US" sz="2400" dirty="0" smtClean="0"/>
+            </a:br>
+            <a:r>
+              <a:rPr lang="en-US" sz="2400" dirty="0"/>
+              <a:t> </a:t>
+            </a:r>
+            <a:r>
+              <a:rPr lang="en-US" sz="2400" dirty="0" smtClean="0"/>
+              <a:t>        BY Roseline .W. Maina</a:t>
             </a:r>
             <a:endParaRPr lang="en-US" sz="2400" dirty="0"/>
           </a:p>
@@ -4169,26 +4289,25 @@
           </a:bodyPr>
           <a:lstStyle/>
           <a:p>
+            <a:pPr marL="742950" indent="-742950">
+              <a:buFont typeface="+mj-lt"/>
+              <a:buAutoNum type="arabicPeriod" startAt="4"/>
+            </a:pPr>
             <a:r>
               <a:rPr lang="en-US" dirty="0"/>
-              <a:t>Data </a:t>
-            </a:r>
-            <a:r>
-              <a:rPr lang="en-US" dirty="0" smtClean="0"/>
-              <a:t>Exploration…</a:t>
-            </a:r>
-            <a:endParaRPr lang="en-US" dirty="0"/>
-          </a:p>
-        </p:txBody>
-      </p:sp>
-      <p:sp>
-        <p:nvSpPr>
-          <p:cNvPr id="5" name="Text Placeholder 4"/>
-          <p:cNvSpPr>
-            <a:spLocks noGrp="1"/>
-          </p:cNvSpPr>
-          <p:nvPr>
-            <p:ph type="body" idx="1"/>
+              <a:t>Data Visualization</a:t>
+            </a:r>
+          </a:p>
+        </p:txBody>
+      </p:sp>
+      <p:sp>
+        <p:nvSpPr>
+          <p:cNvPr id="5" name="Content Placeholder 4"/>
+          <p:cNvSpPr>
+            <a:spLocks noGrp="1"/>
+          </p:cNvSpPr>
+          <p:nvPr>
+            <p:ph idx="1"/>
           </p:nvPr>
         </p:nvSpPr>
         <p:spPr/>
@@ -4196,101 +4315,12 @@
           <a:bodyPr/>
           <a:lstStyle/>
           <a:p>
-            <a:r>
-              <a:rPr lang="en-US"/>
-              <a:t>Product A</a:t>
-            </a:r>
-            <a:endParaRPr lang="en-US" dirty="0"/>
-          </a:p>
-        </p:txBody>
-      </p:sp>
-      <p:sp>
-        <p:nvSpPr>
-          <p:cNvPr id="6" name="Content Placeholder 5"/>
-          <p:cNvSpPr>
-            <a:spLocks noGrp="1"/>
-          </p:cNvSpPr>
-          <p:nvPr>
-            <p:ph sz="half" idx="2"/>
-          </p:nvPr>
-        </p:nvSpPr>
-        <p:spPr/>
-        <p:txBody>
-          <a:bodyPr/>
-          <a:lstStyle/>
-          <a:p>
-            <a:r>
-              <a:rPr lang="en-US"/>
-              <a:t>Feature 1</a:t>
-            </a:r>
-          </a:p>
-          <a:p>
-            <a:r>
-              <a:rPr lang="en-US"/>
-              <a:t>Feature 2</a:t>
-            </a:r>
-          </a:p>
-          <a:p>
-            <a:r>
-              <a:rPr lang="en-US"/>
-              <a:t>Feature 3</a:t>
-            </a:r>
-            <a:endParaRPr lang="en-US" dirty="0"/>
-          </a:p>
-        </p:txBody>
-      </p:sp>
-      <p:sp>
-        <p:nvSpPr>
-          <p:cNvPr id="7" name="Text Placeholder 6"/>
-          <p:cNvSpPr>
-            <a:spLocks noGrp="1"/>
-          </p:cNvSpPr>
-          <p:nvPr>
-            <p:ph type="body" sz="quarter" idx="3"/>
-          </p:nvPr>
-        </p:nvSpPr>
-        <p:spPr/>
-        <p:txBody>
-          <a:bodyPr/>
-          <a:lstStyle/>
-          <a:p>
-            <a:r>
-              <a:rPr lang="en-US"/>
-              <a:t>Product B</a:t>
-            </a:r>
-          </a:p>
-        </p:txBody>
-      </p:sp>
-      <p:sp>
-        <p:nvSpPr>
-          <p:cNvPr id="8" name="Content Placeholder 7"/>
-          <p:cNvSpPr>
-            <a:spLocks noGrp="1"/>
-          </p:cNvSpPr>
-          <p:nvPr>
-            <p:ph sz="quarter" idx="4"/>
-          </p:nvPr>
-        </p:nvSpPr>
-        <p:spPr/>
-        <p:txBody>
-          <a:bodyPr/>
-          <a:lstStyle/>
-          <a:p>
-            <a:r>
-              <a:rPr lang="en-US"/>
-              <a:t>Feature 1</a:t>
-            </a:r>
-          </a:p>
-          <a:p>
-            <a:r>
-              <a:rPr lang="en-US"/>
-              <a:t>Feature 2</a:t>
-            </a:r>
-          </a:p>
-          <a:p>
-            <a:r>
-              <a:rPr lang="en-US"/>
-              <a:t>Feature 3</a:t>
+            <a:pPr marL="0" indent="0">
+              <a:buNone/>
+            </a:pPr>
+            <a:r>
+              <a:rPr lang="en-US" dirty="0"/>
+              <a:t>In this phase, i came up with different visualization models to help me summarize and communicate my finding in a way that is understandable. Some of the models are used are bar plots and scatter plots.</a:t>
             </a:r>
           </a:p>
         </p:txBody>
@@ -4298,13 +4328,20 @@
     </p:spTree>
     <p:extLst>
       <p:ext uri="{BB962C8B-B14F-4D97-AF65-F5344CB8AC3E}">
-        <p14:creationId xmlns:p14="http://schemas.microsoft.com/office/powerpoint/2010/main" val="558809307"/>
+        <p14:creationId xmlns:p14="http://schemas.microsoft.com/office/powerpoint/2010/main" val="648486974"/>
       </p:ext>
     </p:extLst>
   </p:cSld>
   <p:clrMapOvr>
     <a:masterClrMapping/>
   </p:clrMapOvr>
+  <p:timing>
+    <p:tnLst>
+      <p:par>
+        <p:cTn id="1" dur="indefinite" restart="never" nodeType="tmRoot"/>
+      </p:par>
+    </p:tnLst>
+  </p:timing>
 </p:sld>
 </file>
 
@@ -4344,11 +4381,11 @@
           <a:p>
             <a:pPr marL="742950" indent="-742950">
               <a:buFont typeface="+mj-lt"/>
-              <a:buAutoNum type="arabicPeriod" startAt="4"/>
+              <a:buAutoNum type="arabicPeriod" startAt="5"/>
             </a:pPr>
             <a:r>
               <a:rPr lang="en-US" dirty="0"/>
-              <a:t>Data Visualization</a:t>
+              <a:t>Data Deployment</a:t>
             </a:r>
           </a:p>
         </p:txBody>
@@ -4373,21 +4410,41 @@
             </a:pPr>
             <a:r>
               <a:rPr lang="en-US" dirty="0"/>
-              <a:t>In this phase, i came up with different visualization models to help me summarize and communicate my finding in a way that is understandable. Some of the models are used are bar plots and scatter plots.</a:t>
-            </a:r>
+              <a:t>This was the final phase in my analysis. I got to communicate my findings and also provide insights and recommendations.</a:t>
+            </a:r>
+          </a:p>
+          <a:p>
+            <a:pPr marL="0" indent="0">
+              <a:buNone/>
+            </a:pPr>
+            <a:r>
+              <a:rPr lang="en-US" dirty="0"/>
+              <a:t/>
+            </a:r>
+            <a:br>
+              <a:rPr lang="en-US" dirty="0"/>
+            </a:br>
+            <a:endParaRPr lang="en-US" dirty="0"/>
           </a:p>
         </p:txBody>
       </p:sp>
     </p:spTree>
     <p:extLst>
       <p:ext uri="{BB962C8B-B14F-4D97-AF65-F5344CB8AC3E}">
-        <p14:creationId xmlns:p14="http://schemas.microsoft.com/office/powerpoint/2010/main" val="648486974"/>
+        <p14:creationId xmlns:p14="http://schemas.microsoft.com/office/powerpoint/2010/main" val="738400285"/>
       </p:ext>
     </p:extLst>
   </p:cSld>
   <p:clrMapOvr>
     <a:masterClrMapping/>
   </p:clrMapOvr>
+  <p:timing>
+    <p:tnLst>
+      <p:par>
+        <p:cTn id="1" dur="indefinite" restart="never" nodeType="tmRoot"/>
+      </p:par>
+    </p:tnLst>
+  </p:timing>
 </p:sld>
 </file>
 
@@ -4431,7 +4488,11 @@
             </a:r>
             <a:r>
               <a:rPr lang="en-US" dirty="0" smtClean="0"/>
-              <a:t>Visualization…</a:t>
+              <a:t>Deployment.</a:t>
+            </a:r>
+            <a:r>
+              <a:rPr lang="en-US" dirty="0" smtClean="0"/>
+              <a:t>…</a:t>
             </a:r>
             <a:endParaRPr lang="en-US" dirty="0"/>
           </a:p>
@@ -4439,114 +4500,45 @@
       </p:sp>
       <p:sp>
         <p:nvSpPr>
-          <p:cNvPr id="5" name="Text Placeholder 4"/>
-          <p:cNvSpPr>
-            <a:spLocks noGrp="1"/>
-          </p:cNvSpPr>
-          <p:nvPr>
-            <p:ph type="body" idx="1"/>
-          </p:nvPr>
-        </p:nvSpPr>
-        <p:spPr/>
+          <p:cNvPr id="6" name="Content Placeholder 5"/>
+          <p:cNvSpPr>
+            <a:spLocks noGrp="1"/>
+          </p:cNvSpPr>
+          <p:nvPr>
+            <p:ph sz="half" idx="2"/>
+          </p:nvPr>
+        </p:nvSpPr>
+        <p:spPr>
+          <a:xfrm>
+            <a:off x="372537" y="1075270"/>
+            <a:ext cx="8466667" cy="4068233"/>
+          </a:xfrm>
+        </p:spPr>
         <p:txBody>
           <a:bodyPr/>
           <a:lstStyle/>
           <a:p>
-            <a:r>
-              <a:rPr lang="en-US"/>
-              <a:t>Product A</a:t>
+            <a:pPr marL="0" indent="0" algn="l">
+              <a:buNone/>
+            </a:pPr>
+            <a:r>
+              <a:rPr lang="en-US" b="1" dirty="0" smtClean="0"/>
+              <a:t>Data Insights:</a:t>
+            </a:r>
+          </a:p>
+          <a:p>
+            <a:pPr algn="l"/>
+            <a:r>
+              <a:rPr lang="en-US" dirty="0" smtClean="0"/>
+              <a:t>Based on the analysis carried out, I will go over the analysis questions mentioned in the objectives while sharing my findings.</a:t>
             </a:r>
             <a:endParaRPr lang="en-US" dirty="0"/>
           </a:p>
-        </p:txBody>
-      </p:sp>
-      <p:sp>
-        <p:nvSpPr>
-          <p:cNvPr id="6" name="Content Placeholder 5"/>
-          <p:cNvSpPr>
-            <a:spLocks noGrp="1"/>
-          </p:cNvSpPr>
-          <p:nvPr>
-            <p:ph sz="half" idx="2"/>
-          </p:nvPr>
-        </p:nvSpPr>
-        <p:spPr/>
-        <p:txBody>
-          <a:bodyPr/>
-          <a:lstStyle/>
-          <a:p>
-            <a:r>
-              <a:rPr lang="en-US" dirty="0"/>
-              <a:t>Feature 1</a:t>
-            </a:r>
-          </a:p>
-          <a:p>
-            <a:r>
-              <a:rPr lang="en-US" dirty="0"/>
-              <a:t>Feature 2</a:t>
-            </a:r>
-          </a:p>
-          <a:p>
-            <a:r>
-              <a:rPr lang="en-US" dirty="0"/>
-              <a:t>Feature 3</a:t>
-            </a:r>
-          </a:p>
-        </p:txBody>
-      </p:sp>
-      <p:sp>
-        <p:nvSpPr>
-          <p:cNvPr id="7" name="Text Placeholder 6"/>
-          <p:cNvSpPr>
-            <a:spLocks noGrp="1"/>
-          </p:cNvSpPr>
-          <p:nvPr>
-            <p:ph type="body" sz="quarter" idx="3"/>
-          </p:nvPr>
-        </p:nvSpPr>
-        <p:spPr/>
-        <p:txBody>
-          <a:bodyPr/>
-          <a:lstStyle/>
-          <a:p>
-            <a:r>
-              <a:rPr lang="en-US"/>
-              <a:t>Product B</a:t>
-            </a:r>
-          </a:p>
-        </p:txBody>
-      </p:sp>
-      <p:sp>
-        <p:nvSpPr>
-          <p:cNvPr id="8" name="Content Placeholder 7"/>
-          <p:cNvSpPr>
-            <a:spLocks noGrp="1"/>
-          </p:cNvSpPr>
-          <p:nvPr>
-            <p:ph sz="quarter" idx="4"/>
-          </p:nvPr>
-        </p:nvSpPr>
-        <p:spPr/>
-        <p:txBody>
-          <a:bodyPr/>
-          <a:lstStyle/>
-          <a:p>
-            <a:r>
-              <a:rPr lang="en-US"/>
-              <a:t>Feature 1</a:t>
-            </a:r>
-          </a:p>
-          <a:p>
-            <a:r>
-              <a:rPr lang="en-US"/>
-              <a:t>Feature 2</a:t>
-            </a:r>
-          </a:p>
-          <a:p>
-            <a:r>
-              <a:rPr lang="en-US"/>
-              <a:t>Feature 3</a:t>
-            </a:r>
+          <a:p>
+            <a:pPr marL="0" indent="0" algn="l">
+              <a:buNone/>
+            </a:pPr>
+            <a:endParaRPr lang="en-US" dirty="0"/>
           </a:p>
         </p:txBody>
       </p:sp>
@@ -4560,6 +4552,13 @@
   <p:clrMapOvr>
     <a:masterClrMapping/>
   </p:clrMapOvr>
+  <p:timing>
+    <p:tnLst>
+      <p:par>
+        <p:cTn id="1" dur="indefinite" restart="never" nodeType="tmRoot"/>
+      </p:par>
+    </p:tnLst>
+  </p:timing>
 </p:sld>
 </file>
 
@@ -4597,51 +4596,76 @@
           </a:bodyPr>
           <a:lstStyle/>
           <a:p>
-            <a:pPr marL="742950" indent="-742950">
-              <a:buFont typeface="+mj-lt"/>
-              <a:buAutoNum type="arabicPeriod" startAt="5"/>
+            <a:r>
+              <a:rPr lang="en-US" dirty="0"/>
+              <a:t>Data </a:t>
+            </a:r>
+            <a:r>
+              <a:rPr lang="en-US" dirty="0" smtClean="0"/>
+              <a:t>Deployment.</a:t>
+            </a:r>
+            <a:r>
+              <a:rPr lang="en-US" dirty="0" smtClean="0"/>
+              <a:t>…</a:t>
+            </a:r>
+            <a:endParaRPr lang="en-US" dirty="0"/>
+          </a:p>
+        </p:txBody>
+      </p:sp>
+      <p:sp>
+        <p:nvSpPr>
+          <p:cNvPr id="6" name="Content Placeholder 5"/>
+          <p:cNvSpPr>
+            <a:spLocks noGrp="1"/>
+          </p:cNvSpPr>
+          <p:nvPr>
+            <p:ph sz="half" idx="2"/>
+          </p:nvPr>
+        </p:nvSpPr>
+        <p:spPr>
+          <a:xfrm>
+            <a:off x="372537" y="1075270"/>
+            <a:ext cx="8466667" cy="4068233"/>
+          </a:xfrm>
+        </p:spPr>
+        <p:txBody>
+          <a:bodyPr/>
+          <a:lstStyle/>
+          <a:p>
+            <a:pPr marL="457200" indent="-457200" algn="l">
+              <a:buAutoNum type="arabicPeriod"/>
             </a:pPr>
             <a:r>
-              <a:rPr lang="en-US" dirty="0"/>
-              <a:t>Data Deployment</a:t>
-            </a:r>
-          </a:p>
-        </p:txBody>
-      </p:sp>
-      <p:sp>
-        <p:nvSpPr>
-          <p:cNvPr id="5" name="Content Placeholder 4"/>
-          <p:cNvSpPr>
-            <a:spLocks noGrp="1"/>
-          </p:cNvSpPr>
-          <p:nvPr>
-            <p:ph idx="1"/>
-          </p:nvPr>
-        </p:nvSpPr>
-        <p:spPr/>
-        <p:txBody>
-          <a:bodyPr/>
-          <a:lstStyle/>
-          <a:p>
-            <a:pPr marL="0" indent="0">
+              <a:rPr lang="en-US" b="1" dirty="0" smtClean="0"/>
+              <a:t>Relationship between Revenue and Budget:</a:t>
+            </a:r>
+          </a:p>
+          <a:p>
+            <a:pPr algn="l"/>
+            <a:r>
+              <a:rPr lang="en-US" dirty="0" smtClean="0"/>
+              <a:t>Based on the calculated correlation and the plotted graph it is evident that the revenue and budget share  a positive relationship / correlation.</a:t>
+            </a:r>
+          </a:p>
+          <a:p>
+            <a:pPr algn="l"/>
+            <a:r>
+              <a:rPr lang="en-US" dirty="0" smtClean="0"/>
+              <a:t>This means that an increase in one will directly lead to the increase in the other.</a:t>
+            </a:r>
+          </a:p>
+          <a:p>
+            <a:pPr algn="l"/>
+            <a:r>
+              <a:rPr lang="en-US" dirty="0" smtClean="0"/>
+              <a:t>Below is a graph to represent my findings;</a:t>
+            </a:r>
+            <a:endParaRPr lang="en-US" dirty="0"/>
+          </a:p>
+          <a:p>
+            <a:pPr marL="0" indent="0" algn="l">
               <a:buNone/>
             </a:pPr>
-            <a:r>
-              <a:rPr lang="en-US" dirty="0"/>
-              <a:t>This was the final phase in my analysis. I got to communicate my findings and also provide insights and recommendations.</a:t>
-            </a:r>
-          </a:p>
-          <a:p>
-            <a:pPr marL="0" indent="0">
-              <a:buNone/>
-            </a:pPr>
-            <a:r>
-              <a:rPr lang="en-US" dirty="0"/>
-              <a:t/>
-            </a:r>
-            <a:br>
-              <a:rPr lang="en-US" dirty="0"/>
-            </a:br>
             <a:endParaRPr lang="en-US" dirty="0"/>
           </a:p>
         </p:txBody>
@@ -4649,13 +4673,20 @@
     </p:spTree>
     <p:extLst>
       <p:ext uri="{BB962C8B-B14F-4D97-AF65-F5344CB8AC3E}">
-        <p14:creationId xmlns:p14="http://schemas.microsoft.com/office/powerpoint/2010/main" val="738400285"/>
+        <p14:creationId xmlns:p14="http://schemas.microsoft.com/office/powerpoint/2010/main" val="2481608394"/>
       </p:ext>
     </p:extLst>
   </p:cSld>
   <p:clrMapOvr>
     <a:masterClrMapping/>
   </p:clrMapOvr>
+  <p:timing>
+    <p:tnLst>
+      <p:par>
+        <p:cTn id="1" dur="indefinite" restart="never" nodeType="tmRoot"/>
+      </p:par>
+    </p:tnLst>
+  </p:timing>
 </p:sld>
 </file>
 
@@ -4676,161 +4707,40 @@
           <a:chExt cx="0" cy="0"/>
         </a:xfrm>
       </p:grpSpPr>
-      <p:sp>
-        <p:nvSpPr>
-          <p:cNvPr id="4" name="Title 3"/>
-          <p:cNvSpPr>
-            <a:spLocks noGrp="1"/>
-          </p:cNvSpPr>
-          <p:nvPr>
-            <p:ph type="title"/>
-          </p:nvPr>
-        </p:nvSpPr>
-        <p:spPr/>
-        <p:txBody>
-          <a:bodyPr>
-            <a:normAutofit/>
-          </a:bodyPr>
-          <a:lstStyle/>
-          <a:p>
-            <a:r>
-              <a:rPr lang="en-US" dirty="0"/>
-              <a:t>Data </a:t>
-            </a:r>
-            <a:r>
-              <a:rPr lang="en-US" dirty="0" smtClean="0"/>
-              <a:t>Deployment…</a:t>
-            </a:r>
-            <a:endParaRPr lang="en-US" dirty="0"/>
-          </a:p>
-        </p:txBody>
-      </p:sp>
-      <p:sp>
-        <p:nvSpPr>
-          <p:cNvPr id="5" name="Text Placeholder 4"/>
-          <p:cNvSpPr>
-            <a:spLocks noGrp="1"/>
-          </p:cNvSpPr>
-          <p:nvPr>
-            <p:ph type="body" idx="1"/>
-          </p:nvPr>
-        </p:nvSpPr>
-        <p:spPr/>
-        <p:txBody>
-          <a:bodyPr/>
-          <a:lstStyle/>
-          <a:p>
-            <a:pPr algn="l"/>
-            <a:r>
-              <a:rPr lang="en-US" dirty="0" smtClean="0"/>
-              <a:t>Findings</a:t>
-            </a:r>
-            <a:endParaRPr lang="en-US" dirty="0"/>
-          </a:p>
-        </p:txBody>
-      </p:sp>
-      <p:sp>
-        <p:nvSpPr>
-          <p:cNvPr id="6" name="Content Placeholder 5"/>
-          <p:cNvSpPr>
-            <a:spLocks noGrp="1"/>
-          </p:cNvSpPr>
-          <p:nvPr>
-            <p:ph sz="half" idx="2"/>
-          </p:nvPr>
-        </p:nvSpPr>
-        <p:spPr/>
-        <p:txBody>
-          <a:bodyPr/>
-          <a:lstStyle/>
-          <a:p>
-            <a:pPr algn="l"/>
-            <a:r>
-              <a:rPr lang="en-US" dirty="0"/>
-              <a:t>Feature 1</a:t>
-            </a:r>
-          </a:p>
-          <a:p>
-            <a:pPr algn="l"/>
-            <a:r>
-              <a:rPr lang="en-US" dirty="0"/>
-              <a:t>Feature 2</a:t>
-            </a:r>
-          </a:p>
-          <a:p>
-            <a:pPr algn="l"/>
-            <a:r>
-              <a:rPr lang="en-US" dirty="0"/>
-              <a:t>Feature 3</a:t>
-            </a:r>
-          </a:p>
-        </p:txBody>
-      </p:sp>
-      <p:sp>
-        <p:nvSpPr>
-          <p:cNvPr id="7" name="Text Placeholder 6"/>
-          <p:cNvSpPr>
-            <a:spLocks noGrp="1"/>
-          </p:cNvSpPr>
-          <p:nvPr>
-            <p:ph type="body" sz="quarter" idx="3"/>
-          </p:nvPr>
-        </p:nvSpPr>
-        <p:spPr/>
-        <p:txBody>
-          <a:bodyPr/>
-          <a:lstStyle/>
-          <a:p>
-            <a:pPr algn="l"/>
-            <a:r>
-              <a:rPr lang="en-US" dirty="0" smtClean="0"/>
-              <a:t>Recommendations</a:t>
-            </a:r>
-            <a:endParaRPr lang="en-US" dirty="0"/>
-          </a:p>
-        </p:txBody>
-      </p:sp>
-      <p:sp>
-        <p:nvSpPr>
-          <p:cNvPr id="8" name="Content Placeholder 7"/>
-          <p:cNvSpPr>
-            <a:spLocks noGrp="1"/>
-          </p:cNvSpPr>
-          <p:nvPr>
-            <p:ph sz="quarter" idx="4"/>
-          </p:nvPr>
-        </p:nvSpPr>
-        <p:spPr/>
-        <p:txBody>
-          <a:bodyPr/>
-          <a:lstStyle/>
-          <a:p>
-            <a:pPr algn="l"/>
-            <a:r>
-              <a:rPr lang="en-US" dirty="0"/>
-              <a:t>Feature 1</a:t>
-            </a:r>
-          </a:p>
-          <a:p>
-            <a:pPr algn="l"/>
-            <a:r>
-              <a:rPr lang="en-US" dirty="0"/>
-              <a:t>Feature 2</a:t>
-            </a:r>
-          </a:p>
-          <a:p>
-            <a:pPr algn="l"/>
-            <a:r>
-              <a:rPr lang="en-US" dirty="0"/>
-              <a:t>Feature 3</a:t>
-            </a:r>
-          </a:p>
-        </p:txBody>
-      </p:sp>
+      <p:pic>
+        <p:nvPicPr>
+          <p:cNvPr id="4" name="Picture 3"/>
+          <p:cNvPicPr>
+            <a:picLocks noChangeAspect="1"/>
+          </p:cNvPicPr>
+          <p:nvPr/>
+        </p:nvPicPr>
+        <p:blipFill>
+          <a:blip r:embed="rId2">
+            <a:extLst>
+              <a:ext uri="{28A0092B-C50C-407E-A947-70E740481C1C}">
+                <a14:useLocalDpi xmlns:a14="http://schemas.microsoft.com/office/drawing/2010/main" val="0"/>
+              </a:ext>
+            </a:extLst>
+          </a:blip>
+          <a:stretch>
+            <a:fillRect/>
+          </a:stretch>
+        </p:blipFill>
+        <p:spPr>
+          <a:xfrm>
+            <a:off x="-499533" y="-321733"/>
+            <a:ext cx="9795933" cy="5994400"/>
+          </a:xfrm>
+          <a:prstGeom prst="rect">
+            <a:avLst/>
+          </a:prstGeom>
+        </p:spPr>
+      </p:pic>
     </p:spTree>
     <p:extLst>
       <p:ext uri="{BB962C8B-B14F-4D97-AF65-F5344CB8AC3E}">
-        <p14:creationId xmlns:p14="http://schemas.microsoft.com/office/powerpoint/2010/main" val="4022934837"/>
+        <p14:creationId xmlns:p14="http://schemas.microsoft.com/office/powerpoint/2010/main" val="2563038305"/>
       </p:ext>
     </p:extLst>
   </p:cSld>
@@ -4857,16 +4767,506 @@
           <a:chExt cx="0" cy="0"/>
         </a:xfrm>
       </p:grpSpPr>
+      <p:sp>
+        <p:nvSpPr>
+          <p:cNvPr id="4" name="Title 3"/>
+          <p:cNvSpPr>
+            <a:spLocks noGrp="1"/>
+          </p:cNvSpPr>
+          <p:nvPr>
+            <p:ph type="title"/>
+          </p:nvPr>
+        </p:nvSpPr>
+        <p:spPr/>
+        <p:txBody>
+          <a:bodyPr>
+            <a:normAutofit/>
+          </a:bodyPr>
+          <a:lstStyle/>
+          <a:p>
+            <a:r>
+              <a:rPr lang="en-US" dirty="0"/>
+              <a:t>Data </a:t>
+            </a:r>
+            <a:r>
+              <a:rPr lang="en-US" dirty="0" smtClean="0"/>
+              <a:t>Deployment.</a:t>
+            </a:r>
+            <a:r>
+              <a:rPr lang="en-US" dirty="0" smtClean="0"/>
+              <a:t>…</a:t>
+            </a:r>
+            <a:endParaRPr lang="en-US" dirty="0"/>
+          </a:p>
+        </p:txBody>
+      </p:sp>
+      <p:sp>
+        <p:nvSpPr>
+          <p:cNvPr id="6" name="Content Placeholder 5"/>
+          <p:cNvSpPr>
+            <a:spLocks noGrp="1"/>
+          </p:cNvSpPr>
+          <p:nvPr>
+            <p:ph sz="half" idx="2"/>
+          </p:nvPr>
+        </p:nvSpPr>
+        <p:spPr>
+          <a:xfrm>
+            <a:off x="372537" y="1075270"/>
+            <a:ext cx="8466667" cy="4068233"/>
+          </a:xfrm>
+        </p:spPr>
+        <p:txBody>
+          <a:bodyPr>
+            <a:normAutofit fontScale="92500" lnSpcReduction="20000"/>
+          </a:bodyPr>
+          <a:lstStyle/>
+          <a:p>
+            <a:pPr marL="0" indent="0" algn="l">
+              <a:buNone/>
+            </a:pPr>
+            <a:r>
+              <a:rPr lang="en-US" b="1" dirty="0" smtClean="0"/>
+              <a:t>2. Movies that grossed the most revenue vs. movies that had the</a:t>
+            </a:r>
+          </a:p>
+          <a:p>
+            <a:pPr marL="0" indent="0" algn="l">
+              <a:buNone/>
+            </a:pPr>
+            <a:r>
+              <a:rPr lang="en-US" b="1" dirty="0"/>
+              <a:t> </a:t>
+            </a:r>
+            <a:r>
+              <a:rPr lang="en-US" b="1" dirty="0" smtClean="0"/>
+              <a:t>    highest ROI</a:t>
+            </a:r>
+          </a:p>
+          <a:p>
+            <a:pPr algn="l"/>
+            <a:r>
+              <a:rPr lang="en-US" sz="2000" dirty="0" smtClean="0"/>
+              <a:t>Based on my analysis, it showcased that most of the movies that had earned the highest revenue were not the same movies that had the highest return on investment.</a:t>
+            </a:r>
+            <a:endParaRPr lang="en-US" sz="2000" b="1" dirty="0"/>
+          </a:p>
+          <a:p>
+            <a:pPr algn="l"/>
+            <a:r>
+              <a:rPr lang="en-US" sz="2000" dirty="0" smtClean="0"/>
+              <a:t>When I dived a little deeper in my analysis it showed that the movies with the highest ROI, the year of release of most was in the early  90’s  and a few the early 2000’s.</a:t>
+            </a:r>
+          </a:p>
+          <a:p>
+            <a:pPr algn="l"/>
+            <a:r>
+              <a:rPr lang="en-US" sz="2000" dirty="0" smtClean="0"/>
+              <a:t>Based on this I came to the assumption that the value of the money invested in the budget during that period  does not hold the same value in the present day due to factors like inflation over the years.</a:t>
+            </a:r>
+          </a:p>
+          <a:p>
+            <a:pPr algn="l"/>
+            <a:r>
+              <a:rPr lang="en-US" sz="2000" dirty="0" smtClean="0"/>
+              <a:t>Below are two graphs showing the top 20 movie that earned the most revenue and the top 10 movies with the highest ROI</a:t>
+            </a:r>
+          </a:p>
+          <a:p>
+            <a:pPr marL="0" indent="0" algn="l">
+              <a:buNone/>
+            </a:pPr>
+            <a:r>
+              <a:rPr lang="en-US" b="1" dirty="0" smtClean="0"/>
+              <a:t>  </a:t>
+            </a:r>
+            <a:endParaRPr lang="en-US" dirty="0"/>
+          </a:p>
+          <a:p>
+            <a:pPr marL="0" indent="0" algn="l">
+              <a:buNone/>
+            </a:pPr>
+            <a:endParaRPr lang="en-US" dirty="0"/>
+          </a:p>
+        </p:txBody>
+      </p:sp>
     </p:spTree>
     <p:extLst>
       <p:ext uri="{BB962C8B-B14F-4D97-AF65-F5344CB8AC3E}">
-        <p14:creationId xmlns:p14="http://schemas.microsoft.com/office/powerpoint/2010/main" val="109100692"/>
+        <p14:creationId xmlns:p14="http://schemas.microsoft.com/office/powerpoint/2010/main" val="2179815995"/>
       </p:ext>
     </p:extLst>
   </p:cSld>
   <p:clrMapOvr>
     <a:masterClrMapping/>
   </p:clrMapOvr>
+  <p:timing>
+    <p:tnLst>
+      <p:par>
+        <p:cTn id="1" dur="indefinite" restart="never" nodeType="tmRoot"/>
+      </p:par>
+    </p:tnLst>
+  </p:timing>
+</p:sld>
+</file>
+
+<file path=ppt/slides/slide16.xml><?xml version="1.0" encoding="utf-8"?>
+<p:sld xmlns:a="http://schemas.openxmlformats.org/drawingml/2006/main" xmlns:r="http://schemas.openxmlformats.org/officeDocument/2006/relationships" xmlns:p="http://schemas.openxmlformats.org/presentationml/2006/main">
+  <p:cSld>
+    <p:spTree>
+      <p:nvGrpSpPr>
+        <p:cNvPr id="1" name=""/>
+        <p:cNvGrpSpPr/>
+        <p:nvPr/>
+      </p:nvGrpSpPr>
+      <p:grpSpPr>
+        <a:xfrm>
+          <a:off x="0" y="0"/>
+          <a:ext cx="0" cy="0"/>
+          <a:chOff x="0" y="0"/>
+          <a:chExt cx="0" cy="0"/>
+        </a:xfrm>
+      </p:grpSpPr>
+      <p:pic>
+        <p:nvPicPr>
+          <p:cNvPr id="2" name="Picture 1"/>
+          <p:cNvPicPr>
+            <a:picLocks noChangeAspect="1"/>
+          </p:cNvPicPr>
+          <p:nvPr/>
+        </p:nvPicPr>
+        <p:blipFill>
+          <a:blip r:embed="rId3">
+            <a:extLst>
+              <a:ext uri="{28A0092B-C50C-407E-A947-70E740481C1C}">
+                <a14:useLocalDpi xmlns:a14="http://schemas.microsoft.com/office/drawing/2010/main" val="0"/>
+              </a:ext>
+            </a:extLst>
+          </a:blip>
+          <a:stretch>
+            <a:fillRect/>
+          </a:stretch>
+        </p:blipFill>
+        <p:spPr>
+          <a:xfrm>
+            <a:off x="-584200" y="-1710267"/>
+            <a:ext cx="9859442" cy="6934200"/>
+          </a:xfrm>
+          <a:prstGeom prst="rect">
+            <a:avLst/>
+          </a:prstGeom>
+        </p:spPr>
+      </p:pic>
+    </p:spTree>
+    <p:extLst>
+      <p:ext uri="{BB962C8B-B14F-4D97-AF65-F5344CB8AC3E}">
+        <p14:creationId xmlns:p14="http://schemas.microsoft.com/office/powerpoint/2010/main" val="330875516"/>
+      </p:ext>
+    </p:extLst>
+  </p:cSld>
+  <p:clrMapOvr>
+    <a:masterClrMapping/>
+  </p:clrMapOvr>
+  <p:timing>
+    <p:tnLst>
+      <p:par>
+        <p:cTn id="1" dur="indefinite" restart="never" nodeType="tmRoot"/>
+      </p:par>
+    </p:tnLst>
+  </p:timing>
+</p:sld>
+</file>
+
+<file path=ppt/slides/slide17.xml><?xml version="1.0" encoding="utf-8"?>
+<p:sld xmlns:a="http://schemas.openxmlformats.org/drawingml/2006/main" xmlns:r="http://schemas.openxmlformats.org/officeDocument/2006/relationships" xmlns:p="http://schemas.openxmlformats.org/presentationml/2006/main">
+  <p:cSld>
+    <p:spTree>
+      <p:nvGrpSpPr>
+        <p:cNvPr id="1" name=""/>
+        <p:cNvGrpSpPr/>
+        <p:nvPr/>
+      </p:nvGrpSpPr>
+      <p:grpSpPr>
+        <a:xfrm>
+          <a:off x="0" y="0"/>
+          <a:ext cx="0" cy="0"/>
+          <a:chOff x="0" y="0"/>
+          <a:chExt cx="0" cy="0"/>
+        </a:xfrm>
+      </p:grpSpPr>
+      <p:pic>
+        <p:nvPicPr>
+          <p:cNvPr id="2" name="Picture 1"/>
+          <p:cNvPicPr>
+            <a:picLocks noChangeAspect="1"/>
+          </p:cNvPicPr>
+          <p:nvPr/>
+        </p:nvPicPr>
+        <p:blipFill>
+          <a:blip r:embed="rId3">
+            <a:extLst>
+              <a:ext uri="{28A0092B-C50C-407E-A947-70E740481C1C}">
+                <a14:useLocalDpi xmlns:a14="http://schemas.microsoft.com/office/drawing/2010/main" val="0"/>
+              </a:ext>
+            </a:extLst>
+          </a:blip>
+          <a:stretch>
+            <a:fillRect/>
+          </a:stretch>
+        </p:blipFill>
+        <p:spPr>
+          <a:xfrm>
+            <a:off x="-567266" y="-237067"/>
+            <a:ext cx="9787466" cy="6138334"/>
+          </a:xfrm>
+          <a:prstGeom prst="rect">
+            <a:avLst/>
+          </a:prstGeom>
+        </p:spPr>
+      </p:pic>
+    </p:spTree>
+    <p:extLst>
+      <p:ext uri="{BB962C8B-B14F-4D97-AF65-F5344CB8AC3E}">
+        <p14:creationId xmlns:p14="http://schemas.microsoft.com/office/powerpoint/2010/main" val="2114206194"/>
+      </p:ext>
+    </p:extLst>
+  </p:cSld>
+  <p:clrMapOvr>
+    <a:masterClrMapping/>
+  </p:clrMapOvr>
+  <p:timing>
+    <p:tnLst>
+      <p:par>
+        <p:cTn id="1" dur="indefinite" restart="never" nodeType="tmRoot"/>
+      </p:par>
+    </p:tnLst>
+  </p:timing>
+</p:sld>
+</file>
+
+<file path=ppt/slides/slide18.xml><?xml version="1.0" encoding="utf-8"?>
+<p:sld xmlns:a="http://schemas.openxmlformats.org/drawingml/2006/main" xmlns:r="http://schemas.openxmlformats.org/officeDocument/2006/relationships" xmlns:p="http://schemas.openxmlformats.org/presentationml/2006/main">
+  <p:cSld>
+    <p:spTree>
+      <p:nvGrpSpPr>
+        <p:cNvPr id="1" name=""/>
+        <p:cNvGrpSpPr/>
+        <p:nvPr/>
+      </p:nvGrpSpPr>
+      <p:grpSpPr>
+        <a:xfrm>
+          <a:off x="0" y="0"/>
+          <a:ext cx="0" cy="0"/>
+          <a:chOff x="0" y="0"/>
+          <a:chExt cx="0" cy="0"/>
+        </a:xfrm>
+      </p:grpSpPr>
+      <p:sp>
+        <p:nvSpPr>
+          <p:cNvPr id="2" name="Title 1"/>
+          <p:cNvSpPr>
+            <a:spLocks noGrp="1"/>
+          </p:cNvSpPr>
+          <p:nvPr>
+            <p:ph type="title"/>
+          </p:nvPr>
+        </p:nvSpPr>
+        <p:spPr/>
+        <p:txBody>
+          <a:bodyPr/>
+          <a:lstStyle/>
+          <a:p>
+            <a:r>
+              <a:rPr lang="en-US" dirty="0" smtClean="0"/>
+              <a:t>Data Deployment……</a:t>
+            </a:r>
+            <a:endParaRPr lang="en-US" dirty="0"/>
+          </a:p>
+        </p:txBody>
+      </p:sp>
+      <p:sp>
+        <p:nvSpPr>
+          <p:cNvPr id="3" name="Content Placeholder 2"/>
+          <p:cNvSpPr>
+            <a:spLocks noGrp="1"/>
+          </p:cNvSpPr>
+          <p:nvPr>
+            <p:ph idx="1"/>
+          </p:nvPr>
+        </p:nvSpPr>
+        <p:spPr/>
+        <p:txBody>
+          <a:bodyPr>
+            <a:normAutofit fontScale="85000" lnSpcReduction="20000"/>
+          </a:bodyPr>
+          <a:lstStyle/>
+          <a:p>
+            <a:pPr marL="0" indent="0">
+              <a:buNone/>
+            </a:pPr>
+            <a:r>
+              <a:rPr lang="en-US" sz="2400" b="1" dirty="0" smtClean="0"/>
+              <a:t>3. </a:t>
+            </a:r>
+            <a:r>
+              <a:rPr lang="en-US" b="1" dirty="0" smtClean="0"/>
+              <a:t>Movie genres that had the highest rating, earned the    </a:t>
+            </a:r>
+          </a:p>
+          <a:p>
+            <a:pPr marL="0" indent="0">
+              <a:buNone/>
+            </a:pPr>
+            <a:r>
+              <a:rPr lang="en-US" sz="2400" b="1" dirty="0" smtClean="0"/>
+              <a:t>     </a:t>
+            </a:r>
+            <a:r>
+              <a:rPr lang="en-US" b="1" dirty="0" smtClean="0"/>
+              <a:t>most </a:t>
+            </a:r>
+            <a:r>
+              <a:rPr lang="en-US" b="1" dirty="0"/>
+              <a:t>revenue and had the highest Return on investment.</a:t>
+            </a:r>
+          </a:p>
+          <a:p>
+            <a:r>
+              <a:rPr lang="en-US" sz="2400" dirty="0" smtClean="0"/>
+              <a:t>Based on my analysis, it showed that the movie genres with the highest rating was game-shows and music.</a:t>
+            </a:r>
+          </a:p>
+          <a:p>
+            <a:r>
+              <a:rPr lang="en-US" sz="2400" dirty="0" smtClean="0"/>
+              <a:t>The movie genres that earned the most revenue was family and fantasy.</a:t>
+            </a:r>
+          </a:p>
+          <a:p>
+            <a:r>
+              <a:rPr lang="en-US" sz="2400" dirty="0" smtClean="0"/>
+              <a:t>The movie genre with the highest return on investment are musical and animation.</a:t>
+            </a:r>
+          </a:p>
+          <a:p>
+            <a:r>
+              <a:rPr lang="en-US" sz="2400" dirty="0" smtClean="0"/>
+              <a:t>Below are three graphs to showing the :   </a:t>
+            </a:r>
+          </a:p>
+          <a:p>
+            <a:pPr lvl="2" indent="-342900">
+              <a:buFont typeface="Wingdings" pitchFamily="2" charset="2"/>
+              <a:buChar char="§"/>
+            </a:pPr>
+            <a:r>
+              <a:rPr lang="en-US" dirty="0" smtClean="0"/>
+              <a:t>‘Distribution  of Film Genres by Ratings’</a:t>
+            </a:r>
+          </a:p>
+          <a:p>
+            <a:pPr lvl="2" indent="-342900">
+              <a:buFont typeface="Wingdings" pitchFamily="2" charset="2"/>
+              <a:buChar char="§"/>
+            </a:pPr>
+            <a:r>
+              <a:rPr lang="en-US" dirty="0" smtClean="0"/>
+              <a:t>‘Distribution of Revenue by Genre’</a:t>
+            </a:r>
+          </a:p>
+          <a:p>
+            <a:pPr lvl="2" indent="-342900">
+              <a:buFont typeface="Wingdings" pitchFamily="2" charset="2"/>
+              <a:buChar char="§"/>
+            </a:pPr>
+            <a:r>
+              <a:rPr lang="en-US" dirty="0" smtClean="0"/>
+              <a:t>‘Distribution of ROI by genre</a:t>
+            </a:r>
+            <a:r>
+              <a:rPr lang="en-US" sz="2000" dirty="0" smtClean="0"/>
+              <a:t>’</a:t>
+            </a:r>
+          </a:p>
+        </p:txBody>
+      </p:sp>
+    </p:spTree>
+    <p:extLst>
+      <p:ext uri="{BB962C8B-B14F-4D97-AF65-F5344CB8AC3E}">
+        <p14:creationId xmlns:p14="http://schemas.microsoft.com/office/powerpoint/2010/main" val="1998887219"/>
+      </p:ext>
+    </p:extLst>
+  </p:cSld>
+  <p:clrMapOvr>
+    <a:masterClrMapping/>
+  </p:clrMapOvr>
+</p:sld>
+</file>
+
+<file path=ppt/slides/slide19.xml><?xml version="1.0" encoding="utf-8"?>
+<p:sld xmlns:a="http://schemas.openxmlformats.org/drawingml/2006/main" xmlns:r="http://schemas.openxmlformats.org/officeDocument/2006/relationships" xmlns:p="http://schemas.openxmlformats.org/presentationml/2006/main">
+  <p:cSld>
+    <p:spTree>
+      <p:nvGrpSpPr>
+        <p:cNvPr id="1" name=""/>
+        <p:cNvGrpSpPr/>
+        <p:nvPr/>
+      </p:nvGrpSpPr>
+      <p:grpSpPr>
+        <a:xfrm>
+          <a:off x="0" y="0"/>
+          <a:ext cx="0" cy="0"/>
+          <a:chOff x="0" y="0"/>
+          <a:chExt cx="0" cy="0"/>
+        </a:xfrm>
+      </p:grpSpPr>
+      <p:pic>
+        <p:nvPicPr>
+          <p:cNvPr id="3" name="Picture 2"/>
+          <p:cNvPicPr>
+            <a:picLocks noChangeAspect="1"/>
+          </p:cNvPicPr>
+          <p:nvPr/>
+        </p:nvPicPr>
+        <p:blipFill>
+          <a:blip r:embed="rId2">
+            <a:extLst>
+              <a:ext uri="{28A0092B-C50C-407E-A947-70E740481C1C}">
+                <a14:useLocalDpi xmlns:a14="http://schemas.microsoft.com/office/drawing/2010/main" val="0"/>
+              </a:ext>
+            </a:extLst>
+          </a:blip>
+          <a:stretch>
+            <a:fillRect/>
+          </a:stretch>
+        </p:blipFill>
+        <p:spPr>
+          <a:xfrm>
+            <a:off x="-457199" y="-304800"/>
+            <a:ext cx="9694332" cy="5681133"/>
+          </a:xfrm>
+          <a:prstGeom prst="rect">
+            <a:avLst/>
+          </a:prstGeom>
+        </p:spPr>
+      </p:pic>
+    </p:spTree>
+    <p:extLst>
+      <p:ext uri="{BB962C8B-B14F-4D97-AF65-F5344CB8AC3E}">
+        <p14:creationId xmlns:p14="http://schemas.microsoft.com/office/powerpoint/2010/main" val="3233798463"/>
+      </p:ext>
+    </p:extLst>
+  </p:cSld>
+  <p:clrMapOvr>
+    <a:masterClrMapping/>
+  </p:clrMapOvr>
+  <p:timing>
+    <p:tnLst>
+      <p:par>
+        <p:cTn id="1" dur="indefinite" restart="never" nodeType="tmRoot"/>
+      </p:par>
+    </p:tnLst>
+  </p:timing>
 </p:sld>
 </file>
 
@@ -4922,7 +5322,12 @@
             <p:ph idx="1"/>
           </p:nvPr>
         </p:nvSpPr>
-        <p:spPr/>
+        <p:spPr>
+          <a:xfrm>
+            <a:off x="463718" y="1098757"/>
+            <a:ext cx="8246069" cy="3888111"/>
+          </a:xfrm>
+        </p:spPr>
         <p:txBody>
           <a:bodyPr>
             <a:normAutofit/>
@@ -4938,15 +5343,7 @@
             </a:r>
             <a:r>
               <a:rPr lang="en-US" dirty="0" smtClean="0"/>
-              <a:t>: Company {</a:t>
-            </a:r>
-            <a:r>
-              <a:rPr lang="en-US" dirty="0" err="1" smtClean="0"/>
-              <a:t>xxxx</a:t>
-            </a:r>
-            <a:r>
-              <a:rPr lang="en-US" dirty="0" smtClean="0"/>
-              <a:t>} wants to enter into the film industry. In order to provide good recommendations and advice on the entry strategy for the company, data with different information relating to the industry was analyzed. </a:t>
+              <a:t>: Microsoft wants to enter into the film industry. In order to provide good recommendations and advice on the entry strategy for the company, data with different information relating to the industry was analyzed. </a:t>
             </a:r>
             <a:endParaRPr lang="en-US" dirty="0"/>
           </a:p>
@@ -4978,7 +5375,6 @@
               <a:rPr lang="en-US" dirty="0"/>
               <a:t>followed in my analysis. </a:t>
             </a:r>
-            <a:endParaRPr lang="en-US" dirty="0"/>
           </a:p>
         </p:txBody>
       </p:sp>
@@ -4986,6 +5382,242 @@
     <p:extLst>
       <p:ext uri="{BB962C8B-B14F-4D97-AF65-F5344CB8AC3E}">
         <p14:creationId xmlns:p14="http://schemas.microsoft.com/office/powerpoint/2010/main" val="4103309497"/>
+      </p:ext>
+    </p:extLst>
+  </p:cSld>
+  <p:clrMapOvr>
+    <a:masterClrMapping/>
+  </p:clrMapOvr>
+</p:sld>
+</file>
+
+<file path=ppt/slides/slide20.xml><?xml version="1.0" encoding="utf-8"?>
+<p:sld xmlns:a="http://schemas.openxmlformats.org/drawingml/2006/main" xmlns:r="http://schemas.openxmlformats.org/officeDocument/2006/relationships" xmlns:p="http://schemas.openxmlformats.org/presentationml/2006/main">
+  <p:cSld>
+    <p:spTree>
+      <p:nvGrpSpPr>
+        <p:cNvPr id="1" name=""/>
+        <p:cNvGrpSpPr/>
+        <p:nvPr/>
+      </p:nvGrpSpPr>
+      <p:grpSpPr>
+        <a:xfrm>
+          <a:off x="0" y="0"/>
+          <a:ext cx="0" cy="0"/>
+          <a:chOff x="0" y="0"/>
+          <a:chExt cx="0" cy="0"/>
+        </a:xfrm>
+      </p:grpSpPr>
+      <p:pic>
+        <p:nvPicPr>
+          <p:cNvPr id="2" name="Picture 1"/>
+          <p:cNvPicPr>
+            <a:picLocks noChangeAspect="1"/>
+          </p:cNvPicPr>
+          <p:nvPr/>
+        </p:nvPicPr>
+        <p:blipFill>
+          <a:blip r:embed="rId2">
+            <a:extLst>
+              <a:ext uri="{28A0092B-C50C-407E-A947-70E740481C1C}">
+                <a14:useLocalDpi xmlns:a14="http://schemas.microsoft.com/office/drawing/2010/main" val="0"/>
+              </a:ext>
+            </a:extLst>
+          </a:blip>
+          <a:stretch>
+            <a:fillRect/>
+          </a:stretch>
+        </p:blipFill>
+        <p:spPr>
+          <a:xfrm>
+            <a:off x="-550332" y="-279401"/>
+            <a:ext cx="9795932" cy="5782733"/>
+          </a:xfrm>
+          <a:prstGeom prst="rect">
+            <a:avLst/>
+          </a:prstGeom>
+        </p:spPr>
+      </p:pic>
+    </p:spTree>
+    <p:extLst>
+      <p:ext uri="{BB962C8B-B14F-4D97-AF65-F5344CB8AC3E}">
+        <p14:creationId xmlns:p14="http://schemas.microsoft.com/office/powerpoint/2010/main" val="1744594980"/>
+      </p:ext>
+    </p:extLst>
+  </p:cSld>
+  <p:clrMapOvr>
+    <a:masterClrMapping/>
+  </p:clrMapOvr>
+</p:sld>
+</file>
+
+<file path=ppt/slides/slide21.xml><?xml version="1.0" encoding="utf-8"?>
+<p:sld xmlns:a="http://schemas.openxmlformats.org/drawingml/2006/main" xmlns:r="http://schemas.openxmlformats.org/officeDocument/2006/relationships" xmlns:p="http://schemas.openxmlformats.org/presentationml/2006/main">
+  <p:cSld>
+    <p:spTree>
+      <p:nvGrpSpPr>
+        <p:cNvPr id="1" name=""/>
+        <p:cNvGrpSpPr/>
+        <p:nvPr/>
+      </p:nvGrpSpPr>
+      <p:grpSpPr>
+        <a:xfrm>
+          <a:off x="0" y="0"/>
+          <a:ext cx="0" cy="0"/>
+          <a:chOff x="0" y="0"/>
+          <a:chExt cx="0" cy="0"/>
+        </a:xfrm>
+      </p:grpSpPr>
+      <p:pic>
+        <p:nvPicPr>
+          <p:cNvPr id="2" name="Picture 1"/>
+          <p:cNvPicPr>
+            <a:picLocks noChangeAspect="1"/>
+          </p:cNvPicPr>
+          <p:nvPr/>
+        </p:nvPicPr>
+        <p:blipFill>
+          <a:blip r:embed="rId2">
+            <a:extLst>
+              <a:ext uri="{28A0092B-C50C-407E-A947-70E740481C1C}">
+                <a14:useLocalDpi xmlns:a14="http://schemas.microsoft.com/office/drawing/2010/main" val="0"/>
+              </a:ext>
+            </a:extLst>
+          </a:blip>
+          <a:stretch>
+            <a:fillRect/>
+          </a:stretch>
+        </p:blipFill>
+        <p:spPr>
+          <a:xfrm>
+            <a:off x="-507999" y="-304800"/>
+            <a:ext cx="9753600" cy="5448300"/>
+          </a:xfrm>
+          <a:prstGeom prst="rect">
+            <a:avLst/>
+          </a:prstGeom>
+        </p:spPr>
+      </p:pic>
+    </p:spTree>
+    <p:extLst>
+      <p:ext uri="{BB962C8B-B14F-4D97-AF65-F5344CB8AC3E}">
+        <p14:creationId xmlns:p14="http://schemas.microsoft.com/office/powerpoint/2010/main" val="2341386523"/>
+      </p:ext>
+    </p:extLst>
+  </p:cSld>
+  <p:clrMapOvr>
+    <a:masterClrMapping/>
+  </p:clrMapOvr>
+  <p:timing>
+    <p:tnLst>
+      <p:par>
+        <p:cTn id="1" dur="indefinite" restart="never" nodeType="tmRoot"/>
+      </p:par>
+    </p:tnLst>
+  </p:timing>
+</p:sld>
+</file>
+
+<file path=ppt/slides/slide22.xml><?xml version="1.0" encoding="utf-8"?>
+<p:sld xmlns:a="http://schemas.openxmlformats.org/drawingml/2006/main" xmlns:r="http://schemas.openxmlformats.org/officeDocument/2006/relationships" xmlns:p="http://schemas.openxmlformats.org/presentationml/2006/main">
+  <p:cSld>
+    <p:spTree>
+      <p:nvGrpSpPr>
+        <p:cNvPr id="1" name=""/>
+        <p:cNvGrpSpPr/>
+        <p:nvPr/>
+      </p:nvGrpSpPr>
+      <p:grpSpPr>
+        <a:xfrm>
+          <a:off x="0" y="0"/>
+          <a:ext cx="0" cy="0"/>
+          <a:chOff x="0" y="0"/>
+          <a:chExt cx="0" cy="0"/>
+        </a:xfrm>
+      </p:grpSpPr>
+      <p:sp>
+        <p:nvSpPr>
+          <p:cNvPr id="2" name="Title 1"/>
+          <p:cNvSpPr>
+            <a:spLocks noGrp="1"/>
+          </p:cNvSpPr>
+          <p:nvPr>
+            <p:ph type="title"/>
+          </p:nvPr>
+        </p:nvSpPr>
+        <p:spPr/>
+        <p:txBody>
+          <a:bodyPr/>
+          <a:lstStyle/>
+          <a:p>
+            <a:r>
+              <a:rPr lang="en-US" dirty="0" smtClean="0"/>
+              <a:t>Data Deployments……</a:t>
+            </a:r>
+            <a:endParaRPr lang="en-US" dirty="0"/>
+          </a:p>
+        </p:txBody>
+      </p:sp>
+      <p:sp>
+        <p:nvSpPr>
+          <p:cNvPr id="3" name="Content Placeholder 2"/>
+          <p:cNvSpPr>
+            <a:spLocks noGrp="1"/>
+          </p:cNvSpPr>
+          <p:nvPr>
+            <p:ph idx="1"/>
+          </p:nvPr>
+        </p:nvSpPr>
+        <p:spPr/>
+        <p:txBody>
+          <a:bodyPr/>
+          <a:lstStyle/>
+          <a:p>
+            <a:pPr marL="0" indent="0">
+              <a:buNone/>
+            </a:pPr>
+            <a:r>
+              <a:rPr lang="en-US" b="1" dirty="0" smtClean="0"/>
+              <a:t>Recommendations:</a:t>
+            </a:r>
+            <a:endParaRPr lang="en-US" dirty="0" smtClean="0"/>
+          </a:p>
+          <a:p>
+            <a:r>
+              <a:rPr lang="en-US" sz="2000" dirty="0" smtClean="0"/>
+              <a:t>Based on our findings, its clear that the budget invested directly affects the revenue earned therefore the more you invest in the budget the higher the revenue earned.</a:t>
+            </a:r>
+          </a:p>
+          <a:p>
+            <a:r>
+              <a:rPr lang="en-US" sz="2000" dirty="0" smtClean="0"/>
+              <a:t>When it comes to the movies that earned the most revenue and had the highest return on investment, I’d recommend that it’s better to invest in the movie genres that are likely to earn you the most revenue and give the most return on investment.</a:t>
+            </a:r>
+          </a:p>
+          <a:p>
+            <a:pPr marL="0" indent="0">
+              <a:buNone/>
+            </a:pPr>
+            <a:endParaRPr lang="en-US" sz="2000" dirty="0" smtClean="0"/>
+          </a:p>
+          <a:p>
+            <a:pPr marL="0" indent="0">
+              <a:buNone/>
+            </a:pPr>
+            <a:endParaRPr lang="en-US" sz="2000" dirty="0" smtClean="0"/>
+          </a:p>
+          <a:p>
+            <a:pPr marL="0" indent="0">
+              <a:buNone/>
+            </a:pPr>
+            <a:endParaRPr lang="en-US" sz="2000" dirty="0" smtClean="0"/>
+          </a:p>
+        </p:txBody>
+      </p:sp>
+    </p:spTree>
+    <p:extLst>
+      <p:ext uri="{BB962C8B-B14F-4D97-AF65-F5344CB8AC3E}">
+        <p14:creationId xmlns:p14="http://schemas.microsoft.com/office/powerpoint/2010/main" val="1243512336"/>
       </p:ext>
     </p:extLst>
   </p:cSld>
@@ -5049,35 +5681,50 @@
         </p:nvSpPr>
         <p:spPr/>
         <p:txBody>
-          <a:bodyPr/>
+          <a:bodyPr>
+            <a:normAutofit fontScale="92500"/>
+          </a:bodyPr>
           <a:lstStyle/>
           <a:p>
             <a:pPr marL="0" indent="0">
               <a:buNone/>
             </a:pPr>
             <a:r>
-              <a:rPr lang="en-US" b="1" dirty="0" smtClean="0"/>
+              <a:rPr lang="en-US" sz="2400" b="1" dirty="0" smtClean="0"/>
               <a:t>DATASETS: </a:t>
             </a:r>
-          </a:p>
-          <a:p>
-            <a:r>
-              <a:rPr lang="en-US" dirty="0" smtClean="0"/>
-              <a:t>Xxx.csv</a:t>
-            </a:r>
-          </a:p>
-          <a:p>
-            <a:r>
-              <a:rPr lang="en-US" dirty="0" smtClean="0"/>
-              <a:t>used </a:t>
-            </a:r>
-            <a:r>
-              <a:rPr lang="en-US" dirty="0"/>
-              <a:t>in this analysis are:. The aim is to come up with recommendations for the company</a:t>
-            </a:r>
-            <a:r>
-              <a:rPr lang="en-US" dirty="0" smtClean="0"/>
-              <a:t>.</a:t>
+            <a:endParaRPr lang="en-US" sz="2400" dirty="0" smtClean="0"/>
+          </a:p>
+          <a:p>
+            <a:r>
+              <a:rPr lang="en-US" sz="2400" dirty="0" smtClean="0"/>
+              <a:t>Below</a:t>
+            </a:r>
+            <a:r>
+              <a:rPr lang="en-US" sz="2400" dirty="0" smtClean="0"/>
+              <a:t> </a:t>
+            </a:r>
+            <a:r>
+              <a:rPr lang="en-US" sz="2400" dirty="0" smtClean="0"/>
+              <a:t>are the datasets used in this analysis to come up with recommendations for the company:</a:t>
+            </a:r>
+          </a:p>
+          <a:p>
+            <a:r>
+              <a:rPr lang="en-US" sz="2400" dirty="0" smtClean="0"/>
+              <a:t>title.basics.csv  -  that contained data on the different movie genres</a:t>
+            </a:r>
+          </a:p>
+          <a:p>
+            <a:r>
+              <a:rPr lang="en-US" sz="2400" dirty="0" smtClean="0"/>
+              <a:t>title.ratings.csv -  that contained data on the respective movie ratings</a:t>
+            </a:r>
+          </a:p>
+          <a:p>
+            <a:r>
+              <a:rPr lang="en-US" sz="2400" dirty="0" smtClean="0"/>
+              <a:t>tn.movies_budgets.csv  - that contained data on the production budget and the revenue earned by the different movies</a:t>
             </a:r>
           </a:p>
           <a:p>
@@ -5085,10 +5732,10 @@
               <a:buNone/>
             </a:pPr>
             <a:r>
-              <a:rPr lang="en-US" dirty="0" smtClean="0"/>
+              <a:rPr lang="en-US" sz="2400" dirty="0" smtClean="0"/>
               <a:t> </a:t>
             </a:r>
-            <a:endParaRPr lang="en-US" dirty="0"/>
+            <a:endParaRPr lang="en-US" sz="2400" dirty="0"/>
           </a:p>
         </p:txBody>
       </p:sp>
@@ -5159,8 +5806,8 @@
         </p:nvSpPr>
         <p:spPr>
           <a:xfrm>
-            <a:off x="582134" y="1073356"/>
-            <a:ext cx="8246070" cy="3679720"/>
+            <a:off x="582138" y="1073358"/>
+            <a:ext cx="8246069" cy="3679720"/>
           </a:xfrm>
         </p:spPr>
         <p:txBody>
@@ -5193,8 +5840,8 @@
         </p:nvSpPr>
         <p:spPr>
           <a:xfrm>
-            <a:off x="372519" y="1659467"/>
-            <a:ext cx="1921935" cy="872066"/>
+            <a:off x="372519" y="1659469"/>
+            <a:ext cx="1921934" cy="872066"/>
           </a:xfrm>
           <a:prstGeom prst="ellipse">
             <a:avLst/>
@@ -5237,8 +5884,8 @@
         </p:nvSpPr>
         <p:spPr>
           <a:xfrm>
-            <a:off x="1964299" y="2992945"/>
-            <a:ext cx="1921935" cy="872066"/>
+            <a:off x="1964301" y="2992945"/>
+            <a:ext cx="1921934" cy="872066"/>
           </a:xfrm>
           <a:prstGeom prst="ellipse">
             <a:avLst/>
@@ -5281,8 +5928,8 @@
         </p:nvSpPr>
         <p:spPr>
           <a:xfrm>
-            <a:off x="3877778" y="1659467"/>
-            <a:ext cx="1921935" cy="872066"/>
+            <a:off x="3877780" y="1659469"/>
+            <a:ext cx="1921934" cy="872066"/>
           </a:xfrm>
           <a:prstGeom prst="ellipse">
             <a:avLst/>
@@ -5325,8 +5972,8 @@
         </p:nvSpPr>
         <p:spPr>
           <a:xfrm>
-            <a:off x="5676916" y="3043751"/>
-            <a:ext cx="1921935" cy="872066"/>
+            <a:off x="5676917" y="3043753"/>
+            <a:ext cx="1921934" cy="872066"/>
           </a:xfrm>
           <a:prstGeom prst="ellipse">
             <a:avLst/>
@@ -5369,8 +6016,8 @@
         </p:nvSpPr>
         <p:spPr>
           <a:xfrm>
-            <a:off x="7073918" y="1659467"/>
-            <a:ext cx="1921935" cy="872066"/>
+            <a:off x="7073918" y="1659469"/>
+            <a:ext cx="1921934" cy="872066"/>
           </a:xfrm>
           <a:prstGeom prst="ellipse">
             <a:avLst/>
@@ -5416,7 +6063,7 @@
         </p:nvCxnSpPr>
         <p:spPr>
           <a:xfrm rot="16200000" flipH="1">
-            <a:off x="1200171" y="2664849"/>
+            <a:off x="1200176" y="2664849"/>
             <a:ext cx="897445" cy="630812"/>
           </a:xfrm>
           <a:prstGeom prst="curvedConnector2">
@@ -5452,8 +6099,8 @@
         </p:nvCxnSpPr>
         <p:spPr>
           <a:xfrm flipH="1" flipV="1">
-            <a:off x="3877778" y="2095500"/>
-            <a:ext cx="8456" cy="1333478"/>
+            <a:off x="3877783" y="2095501"/>
+            <a:ext cx="8457" cy="1333478"/>
           </a:xfrm>
           <a:prstGeom prst="curvedConnector5">
             <a:avLst>
@@ -5492,8 +6139,8 @@
         </p:nvCxnSpPr>
         <p:spPr>
           <a:xfrm flipH="1">
-            <a:off x="5676916" y="2095500"/>
-            <a:ext cx="122797" cy="1384284"/>
+            <a:off x="5676918" y="2095501"/>
+            <a:ext cx="122796" cy="1384284"/>
           </a:xfrm>
           <a:prstGeom prst="curvedConnector5">
             <a:avLst>
@@ -5532,7 +6179,7 @@
         </p:nvCxnSpPr>
         <p:spPr>
           <a:xfrm rot="5400000" flipH="1" flipV="1">
-            <a:off x="6381776" y="2351609"/>
+            <a:off x="6381781" y="2351610"/>
             <a:ext cx="948251" cy="436034"/>
           </a:xfrm>
           <a:prstGeom prst="curvedConnector2">
@@ -5633,18 +6280,18 @@
         <p:spPr/>
         <p:txBody>
           <a:bodyPr>
-            <a:normAutofit fontScale="92500" lnSpcReduction="20000"/>
+            <a:noAutofit/>
           </a:bodyPr>
           <a:lstStyle/>
           <a:p>
             <a:r>
-              <a:rPr lang="en-US" dirty="0"/>
+              <a:rPr lang="en-US" sz="2400" dirty="0"/>
               <a:t>In this phase i focused on understanding the objectives and</a:t>
             </a:r>
           </a:p>
           <a:p>
             <a:r>
-              <a:rPr lang="en-US" dirty="0"/>
+              <a:rPr lang="en-US" sz="2400" dirty="0"/>
               <a:t>requirements of the project. Based off the project summary that was provided, it is evident that our client is seeking to venture into the Film Industry and would like us to provide him with insights on what types of movies are doing the best at the box office and also how different factors would affect their investment.</a:t>
             </a:r>
           </a:p>
@@ -5721,8 +6368,8 @@
         </p:nvSpPr>
         <p:spPr>
           <a:xfrm>
-            <a:off x="522130" y="1407799"/>
-            <a:ext cx="4659469" cy="479822"/>
+            <a:off x="522133" y="1407799"/>
+            <a:ext cx="4659468" cy="479822"/>
           </a:xfrm>
         </p:spPr>
         <p:txBody>
@@ -5736,7 +6383,6 @@
               <a:rPr lang="en-US" dirty="0"/>
               <a:t>Based on this, the objectives of this analysis were:</a:t>
             </a:r>
-            <a:endParaRPr lang="en-US" dirty="0"/>
           </a:p>
         </p:txBody>
       </p:sp>
@@ -5752,13 +6398,13 @@
         </p:nvSpPr>
         <p:spPr>
           <a:xfrm>
-            <a:off x="522131" y="1914062"/>
-            <a:ext cx="8198536" cy="2276294"/>
+            <a:off x="522131" y="1914064"/>
+            <a:ext cx="8198537" cy="2276294"/>
           </a:xfrm>
         </p:spPr>
         <p:txBody>
           <a:bodyPr>
-            <a:normAutofit fontScale="92500" lnSpcReduction="10000"/>
+            <a:normAutofit fontScale="85000" lnSpcReduction="20000"/>
           </a:bodyPr>
           <a:lstStyle/>
           <a:p>
@@ -5767,8 +6413,17 @@
             </a:pPr>
             <a:r>
               <a:rPr lang="en-US" dirty="0"/>
-              <a:t>   1. Finding the relationship between the budget and revenue.</a:t>
-            </a:r>
+              <a:t>   1. Finding the relationship between the </a:t>
+            </a:r>
+            <a:r>
+              <a:rPr lang="en-US" dirty="0" smtClean="0"/>
+              <a:t>revenue and budget</a:t>
+            </a:r>
+            <a:r>
+              <a:rPr lang="en-US" dirty="0" smtClean="0"/>
+              <a:t>.</a:t>
+            </a:r>
+            <a:endParaRPr lang="en-US" dirty="0"/>
           </a:p>
           <a:p>
             <a:pPr marL="0" indent="0" algn="l">
@@ -5776,8 +6431,25 @@
             </a:pPr>
             <a:r>
               <a:rPr lang="en-US" dirty="0"/>
-              <a:t>   2. Finding the top 20 movies that grossed the most revenue</a:t>
-            </a:r>
+              <a:t>   2. Finding the top 20 movies that </a:t>
+            </a:r>
+            <a:r>
+              <a:rPr lang="en-US" dirty="0" smtClean="0"/>
+              <a:t>grossed</a:t>
+            </a:r>
+            <a:r>
+              <a:rPr lang="en-US" dirty="0" smtClean="0"/>
+              <a:t> </a:t>
+            </a:r>
+            <a:r>
+              <a:rPr lang="en-US" dirty="0"/>
+              <a:t>the most </a:t>
+            </a:r>
+            <a:r>
+              <a:rPr lang="en-US" dirty="0" smtClean="0"/>
+              <a:t>revenue.</a:t>
+            </a:r>
+            <a:endParaRPr lang="en-US" dirty="0"/>
           </a:p>
           <a:p>
             <a:pPr marL="0" indent="0" algn="l">
@@ -5785,8 +6457,13 @@
             </a:pPr>
             <a:r>
               <a:rPr lang="en-US" dirty="0"/>
-              <a:t>   3. Perform analysis on the Return On Investment(ROI)</a:t>
-            </a:r>
+              <a:t>   3. Perform analysis on the Return On Investment(ROI</a:t>
+            </a:r>
+            <a:r>
+              <a:rPr lang="en-US" dirty="0" smtClean="0"/>
+              <a:t>).</a:t>
+            </a:r>
+            <a:endParaRPr lang="en-US" dirty="0"/>
           </a:p>
           <a:p>
             <a:pPr marL="0" indent="0" algn="l">
@@ -5794,8 +6471,13 @@
             </a:pPr>
             <a:r>
               <a:rPr lang="en-US" dirty="0"/>
-              <a:t>   4. Finding which movie genres had the highest ratings</a:t>
-            </a:r>
+              <a:t>   4. Finding which movie genres had the highest </a:t>
+            </a:r>
+            <a:r>
+              <a:rPr lang="en-US" dirty="0" smtClean="0"/>
+              <a:t>ratings.</a:t>
+            </a:r>
+            <a:endParaRPr lang="en-US" dirty="0"/>
           </a:p>
           <a:p>
             <a:pPr marL="0" indent="0" algn="l">
@@ -5807,7 +6489,20 @@
             </a:r>
             <a:r>
               <a:rPr lang="en-US" dirty="0" smtClean="0"/>
-              <a:t>ROI</a:t>
+              <a:t>ROI and earned the</a:t>
+            </a:r>
+          </a:p>
+          <a:p>
+            <a:pPr marL="0" indent="0" algn="l">
+              <a:buNone/>
+            </a:pPr>
+            <a:r>
+              <a:rPr lang="en-US" dirty="0"/>
+              <a:t> </a:t>
+            </a:r>
+            <a:r>
+              <a:rPr lang="en-US" dirty="0" smtClean="0"/>
+              <a:t>       highest revenue.</a:t>
             </a:r>
             <a:r>
               <a:rPr lang="en-US" dirty="0"/>
@@ -5836,6 +6531,13 @@
   <p:clrMapOvr>
     <a:masterClrMapping/>
   </p:clrMapOvr>
+  <p:timing>
+    <p:tnLst>
+      <p:par>
+        <p:cTn id="1" dur="indefinite" restart="never" nodeType="tmRoot"/>
+      </p:par>
+    </p:tnLst>
+  </p:timing>
 </p:sld>
 </file>
 
@@ -5896,7 +6598,9 @@
         </p:nvSpPr>
         <p:spPr/>
         <p:txBody>
-          <a:bodyPr/>
+          <a:bodyPr>
+            <a:normAutofit/>
+          </a:bodyPr>
           <a:lstStyle/>
           <a:p>
             <a:pPr marL="0" indent="0">
@@ -5904,7 +6608,35 @@
             </a:pPr>
             <a:r>
               <a:rPr lang="en-US" dirty="0"/>
-              <a:t>Here, i did the selection of the data i will use from different table then did the data cleaning by checking to see if there are missing values in the data, the presence of outliers, invalid data, duplicates or </a:t>
+              <a:t>Here</a:t>
+            </a:r>
+            <a:r>
+              <a:rPr lang="en-US" dirty="0" smtClean="0"/>
+              <a:t>, with the data collected,  </a:t>
+            </a:r>
+            <a:r>
+              <a:rPr lang="en-US" dirty="0"/>
+              <a:t>i did the selection of the </a:t>
+            </a:r>
+            <a:r>
+              <a:rPr lang="en-US" dirty="0" smtClean="0"/>
+              <a:t>different fields</a:t>
+            </a:r>
+            <a:r>
+              <a:rPr lang="en-US" dirty="0" smtClean="0"/>
+              <a:t> </a:t>
+            </a:r>
+            <a:r>
+              <a:rPr lang="en-US" dirty="0"/>
+              <a:t>i will use from different </a:t>
+            </a:r>
+            <a:r>
+              <a:rPr lang="en-US" dirty="0" smtClean="0"/>
+              <a:t>tables </a:t>
+            </a:r>
+            <a:r>
+              <a:rPr lang="en-US" dirty="0"/>
+              <a:t>then did the data cleaning by checking to see if there are missing values in the data, the presence of outliers, invalid data, duplicates or </a:t>
             </a:r>
             <a:r>
               <a:rPr lang="en-US" dirty="0" smtClean="0"/>
@@ -5927,6 +6659,13 @@
   <p:clrMapOvr>
     <a:masterClrMapping/>
   </p:clrMapOvr>
+  <p:timing>
+    <p:tnLst>
+      <p:par>
+        <p:cTn id="1" dur="indefinite" restart="never" nodeType="tmRoot"/>
+      </p:par>
+    </p:tnLst>
+  </p:timing>
 </p:sld>
 </file>
 
@@ -5964,141 +6703,73 @@
           </a:bodyPr>
           <a:lstStyle/>
           <a:p>
+            <a:pPr marL="742950" indent="-742950">
+              <a:buFont typeface="+mj-lt"/>
+              <a:buAutoNum type="arabicPeriod" startAt="3"/>
+            </a:pPr>
             <a:r>
               <a:rPr lang="en-US" dirty="0"/>
-              <a:t>Data </a:t>
+              <a:t>Data Exploration</a:t>
+            </a:r>
+          </a:p>
+        </p:txBody>
+      </p:sp>
+      <p:sp>
+        <p:nvSpPr>
+          <p:cNvPr id="5" name="Content Placeholder 4"/>
+          <p:cNvSpPr>
+            <a:spLocks noGrp="1"/>
+          </p:cNvSpPr>
+          <p:nvPr>
+            <p:ph idx="1"/>
+          </p:nvPr>
+        </p:nvSpPr>
+        <p:spPr/>
+        <p:txBody>
+          <a:bodyPr/>
+          <a:lstStyle/>
+          <a:p>
+            <a:pPr marL="0" indent="0">
+              <a:buNone/>
+            </a:pPr>
+            <a:r>
+              <a:rPr lang="en-US" dirty="0"/>
+              <a:t>Here, i did the data exploration by checking to see if there are any patterns and relations in the data. Derive new attributes like the revenue that would help answer some of my analysis questions, integrate the data by joining </a:t>
             </a:r>
             <a:r>
               <a:rPr lang="en-US" dirty="0" smtClean="0"/>
-              <a:t>Preparation…</a:t>
-            </a:r>
+              <a:t>different </a:t>
+            </a:r>
+            <a:r>
+              <a:rPr lang="en-US" dirty="0"/>
+              <a:t>data frames also format the data where necessary.</a:t>
+            </a:r>
+          </a:p>
+          <a:p>
+            <a:pPr marL="0" indent="0">
+              <a:buNone/>
+            </a:pPr>
             <a:endParaRPr lang="en-US" dirty="0"/>
-          </a:p>
-        </p:txBody>
-      </p:sp>
-      <p:sp>
-        <p:nvSpPr>
-          <p:cNvPr id="5" name="Text Placeholder 4"/>
-          <p:cNvSpPr>
-            <a:spLocks noGrp="1"/>
-          </p:cNvSpPr>
-          <p:nvPr>
-            <p:ph type="body" idx="1"/>
-          </p:nvPr>
-        </p:nvSpPr>
-        <p:spPr/>
-        <p:txBody>
-          <a:bodyPr/>
-          <a:lstStyle/>
-          <a:p>
-            <a:r>
-              <a:rPr lang="en-US"/>
-              <a:t>Product A</a:t>
-            </a:r>
-            <a:endParaRPr lang="en-US" dirty="0"/>
-          </a:p>
-        </p:txBody>
-      </p:sp>
-      <p:sp>
-        <p:nvSpPr>
-          <p:cNvPr id="6" name="Content Placeholder 5"/>
-          <p:cNvSpPr>
-            <a:spLocks noGrp="1"/>
-          </p:cNvSpPr>
-          <p:nvPr>
-            <p:ph sz="half" idx="2"/>
-          </p:nvPr>
-        </p:nvSpPr>
-        <p:spPr/>
-        <p:txBody>
-          <a:bodyPr/>
-          <a:lstStyle/>
-          <a:p>
-            <a:r>
-              <a:rPr lang="en-US" dirty="0"/>
-              <a:t>Feature 1</a:t>
-            </a:r>
-          </a:p>
-          <a:p>
-            <a:r>
-              <a:rPr lang="en-US" dirty="0"/>
-              <a:t>Feature 2</a:t>
-            </a:r>
-          </a:p>
-          <a:p>
-            <a:r>
-              <a:rPr lang="en-US" dirty="0"/>
-              <a:t>Feature 3</a:t>
-            </a:r>
-          </a:p>
-        </p:txBody>
-      </p:sp>
-      <p:sp>
-        <p:nvSpPr>
-          <p:cNvPr id="7" name="Text Placeholder 6"/>
-          <p:cNvSpPr>
-            <a:spLocks noGrp="1"/>
-          </p:cNvSpPr>
-          <p:nvPr>
-            <p:ph type="body" sz="quarter" idx="3"/>
-          </p:nvPr>
-        </p:nvSpPr>
-        <p:spPr/>
-        <p:txBody>
-          <a:bodyPr/>
-          <a:lstStyle/>
-          <a:p>
-            <a:r>
-              <a:rPr lang="en-US"/>
-              <a:t>Product B</a:t>
-            </a:r>
-          </a:p>
-        </p:txBody>
-      </p:sp>
-      <p:sp>
-        <p:nvSpPr>
-          <p:cNvPr id="8" name="Content Placeholder 7"/>
-          <p:cNvSpPr>
-            <a:spLocks noGrp="1"/>
-          </p:cNvSpPr>
-          <p:nvPr>
-            <p:ph sz="quarter" idx="4"/>
-          </p:nvPr>
-        </p:nvSpPr>
-        <p:spPr/>
-        <p:txBody>
-          <a:bodyPr/>
-          <a:lstStyle/>
-          <a:p>
-            <a:r>
-              <a:rPr lang="en-US"/>
-              <a:t>Feature 1</a:t>
-            </a:r>
-          </a:p>
-          <a:p>
-            <a:r>
-              <a:rPr lang="en-US"/>
-              <a:t>Feature 2</a:t>
-            </a:r>
-          </a:p>
-          <a:p>
-            <a:r>
-              <a:rPr lang="en-US"/>
-              <a:t>Feature 3</a:t>
-            </a:r>
           </a:p>
         </p:txBody>
       </p:sp>
     </p:spTree>
     <p:extLst>
       <p:ext uri="{BB962C8B-B14F-4D97-AF65-F5344CB8AC3E}">
-        <p14:creationId xmlns:p14="http://schemas.microsoft.com/office/powerpoint/2010/main" val="463058547"/>
+        <p14:creationId xmlns:p14="http://schemas.microsoft.com/office/powerpoint/2010/main" val="1381303234"/>
       </p:ext>
     </p:extLst>
   </p:cSld>
   <p:clrMapOvr>
     <a:masterClrMapping/>
   </p:clrMapOvr>
+  <p:timing>
+    <p:tnLst>
+      <p:par>
+        <p:cTn id="1" dur="indefinite" restart="never" nodeType="tmRoot"/>
+      </p:par>
+    </p:tnLst>
+  </p:timing>
 </p:sld>
 </file>
 
@@ -6136,52 +6807,105 @@
           </a:bodyPr>
           <a:lstStyle/>
           <a:p>
-            <a:pPr marL="742950" indent="-742950">
-              <a:buFont typeface="+mj-lt"/>
-              <a:buAutoNum type="arabicPeriod" startAt="3"/>
-            </a:pPr>
             <a:r>
               <a:rPr lang="en-US" dirty="0"/>
-              <a:t>Data Exploration</a:t>
-            </a:r>
-          </a:p>
-        </p:txBody>
-      </p:sp>
-      <p:sp>
-        <p:nvSpPr>
-          <p:cNvPr id="5" name="Content Placeholder 4"/>
-          <p:cNvSpPr>
-            <a:spLocks noGrp="1"/>
-          </p:cNvSpPr>
-          <p:nvPr>
-            <p:ph idx="1"/>
-          </p:nvPr>
-        </p:nvSpPr>
-        <p:spPr/>
-        <p:txBody>
-          <a:bodyPr/>
-          <a:lstStyle/>
-          <a:p>
-            <a:pPr marL="0" indent="0">
-              <a:buNone/>
-            </a:pPr>
-            <a:r>
-              <a:rPr lang="en-US" dirty="0"/>
-              <a:t>Here, i did the data exploration by checking to see if there are any patterns and relations in the data. Derive new attributes like the revenue that would help answer some of my analysis questions, integrate the data by joining </a:t>
+              <a:t>Data </a:t>
             </a:r>
             <a:r>
               <a:rPr lang="en-US" dirty="0" smtClean="0"/>
-              <a:t>different </a:t>
-            </a:r>
-            <a:r>
-              <a:rPr lang="en-US" dirty="0"/>
-              <a:t>data frames also format the data where necessary.</a:t>
-            </a:r>
-          </a:p>
-          <a:p>
-            <a:pPr marL="0" indent="0">
-              <a:buNone/>
-            </a:pPr>
+              <a:t>Exploration…</a:t>
+            </a:r>
+            <a:endParaRPr lang="en-US" dirty="0"/>
+          </a:p>
+        </p:txBody>
+      </p:sp>
+      <p:sp>
+        <p:nvSpPr>
+          <p:cNvPr id="6" name="Content Placeholder 5"/>
+          <p:cNvSpPr>
+            <a:spLocks noGrp="1"/>
+          </p:cNvSpPr>
+          <p:nvPr>
+            <p:ph sz="half" idx="2"/>
+          </p:nvPr>
+        </p:nvSpPr>
+        <p:spPr>
+          <a:xfrm>
+            <a:off x="522135" y="1684867"/>
+            <a:ext cx="7021669" cy="2243666"/>
+          </a:xfrm>
+        </p:spPr>
+        <p:txBody>
+          <a:bodyPr>
+            <a:normAutofit fontScale="70000" lnSpcReduction="20000"/>
+          </a:bodyPr>
+          <a:lstStyle/>
+          <a:p>
+            <a:pPr algn="l"/>
+            <a:r>
+              <a:rPr lang="en-US" sz="3100" dirty="0" smtClean="0"/>
+              <a:t>Descriptive statistics like calculating the correlation coefficient, calculating the ROI etc.</a:t>
+            </a:r>
+          </a:p>
+          <a:p>
+            <a:pPr algn="l"/>
+            <a:r>
+              <a:rPr lang="en-US" sz="3100" dirty="0" smtClean="0"/>
+              <a:t>Investigated the structure of the dataset and also got to familiarize myself with the different data types in the data columns and the data dimensions.</a:t>
+            </a:r>
+          </a:p>
+          <a:p>
+            <a:pPr algn="l"/>
+            <a:r>
+              <a:rPr lang="en-US" sz="3100" dirty="0" smtClean="0"/>
+              <a:t>In this phase I also tackled the questions mentioned in the analysis objectives.</a:t>
+            </a:r>
+          </a:p>
+          <a:p>
+            <a:pPr algn="l"/>
+            <a:endParaRPr lang="en-US" sz="2000" dirty="0" smtClean="0"/>
+          </a:p>
+          <a:p>
+            <a:pPr algn="l"/>
+            <a:endParaRPr lang="en-US" dirty="0"/>
+          </a:p>
+          <a:p>
+            <a:pPr algn="l"/>
+            <a:endParaRPr lang="en-US" dirty="0"/>
+          </a:p>
+          <a:p>
+            <a:pPr algn="l"/>
+            <a:endParaRPr lang="en-US" dirty="0"/>
+          </a:p>
+        </p:txBody>
+      </p:sp>
+      <p:sp>
+        <p:nvSpPr>
+          <p:cNvPr id="3" name="Text Placeholder 2"/>
+          <p:cNvSpPr>
+            <a:spLocks noGrp="1"/>
+          </p:cNvSpPr>
+          <p:nvPr>
+            <p:ph type="body" idx="1"/>
+          </p:nvPr>
+        </p:nvSpPr>
+        <p:spPr>
+          <a:xfrm>
+            <a:off x="522131" y="965202"/>
+            <a:ext cx="5997202" cy="694267"/>
+          </a:xfrm>
+        </p:spPr>
+        <p:txBody>
+          <a:bodyPr>
+            <a:normAutofit fontScale="92500" lnSpcReduction="20000"/>
+          </a:bodyPr>
+          <a:lstStyle/>
+          <a:p>
+            <a:pPr algn="l"/>
+            <a:r>
+              <a:rPr lang="en-US" dirty="0" smtClean="0"/>
+              <a:t>Some of the activities carried out in this phase include:</a:t>
+            </a:r>
             <a:endParaRPr lang="en-US" dirty="0"/>
           </a:p>
         </p:txBody>
@@ -6189,13 +6913,20 @@
     </p:spTree>
     <p:extLst>
       <p:ext uri="{BB962C8B-B14F-4D97-AF65-F5344CB8AC3E}">
-        <p14:creationId xmlns:p14="http://schemas.microsoft.com/office/powerpoint/2010/main" val="1381303234"/>
+        <p14:creationId xmlns:p14="http://schemas.microsoft.com/office/powerpoint/2010/main" val="463058547"/>
       </p:ext>
     </p:extLst>
   </p:cSld>
   <p:clrMapOvr>
     <a:masterClrMapping/>
   </p:clrMapOvr>
+  <p:timing>
+    <p:tnLst>
+      <p:par>
+        <p:cTn id="1" dur="indefinite" restart="never" nodeType="tmRoot"/>
+      </p:par>
+    </p:tnLst>
+  </p:timing>
 </p:sld>
 </file>
 

</xml_diff>